<commit_message>
added a title label for pathway diagram view
</commit_message>
<xml_diff>
--- a/docs/UserInterfaceDesign.pptx
+++ b/docs/UserInterfaceDesign.pptx
@@ -4,8 +4,12 @@
   <p:sldMasterIdLst>
     <p:sldMasterId id="2147483660" r:id="rId1"/>
   </p:sldMasterIdLst>
+  <p:notesMasterIdLst>
+    <p:notesMasterId r:id="rId4"/>
+  </p:notesMasterIdLst>
   <p:sldIdLst>
     <p:sldId id="256" r:id="rId2"/>
+    <p:sldId id="257" r:id="rId3"/>
   </p:sldIdLst>
   <p:sldSz cx="12192000" cy="9144000"/>
   <p:notesSz cx="6858000" cy="9144000"/>
@@ -104,7 +108,445 @@
       </a:defRPr>
     </a:lvl9pPr>
   </p:defaultTextStyle>
+  <p:extLst>
+    <p:ext uri="{EFAFB233-063F-42B5-8137-9DF3F51BA10A}">
+      <p15:sldGuideLst xmlns:p15="http://schemas.microsoft.com/office/powerpoint/2012/main"/>
+    </p:ext>
+  </p:extLst>
 </p:presentation>
+</file>
+
+<file path=ppt/notesMasters/notesMaster1.xml><?xml version="1.0" encoding="utf-8"?>
+<p:notesMaster xmlns:a="http://schemas.openxmlformats.org/drawingml/2006/main" xmlns:r="http://schemas.openxmlformats.org/officeDocument/2006/relationships" xmlns:p="http://schemas.openxmlformats.org/presentationml/2006/main">
+  <p:cSld>
+    <p:bg>
+      <p:bgRef idx="1001">
+        <a:schemeClr val="bg1"/>
+      </p:bgRef>
+    </p:bg>
+    <p:spTree>
+      <p:nvGrpSpPr>
+        <p:cNvPr id="1" name=""/>
+        <p:cNvGrpSpPr/>
+        <p:nvPr/>
+      </p:nvGrpSpPr>
+      <p:grpSpPr>
+        <a:xfrm>
+          <a:off x="0" y="0"/>
+          <a:ext cx="0" cy="0"/>
+          <a:chOff x="0" y="0"/>
+          <a:chExt cx="0" cy="0"/>
+        </a:xfrm>
+      </p:grpSpPr>
+      <p:sp>
+        <p:nvSpPr>
+          <p:cNvPr id="2" name="Header Placeholder 1"/>
+          <p:cNvSpPr>
+            <a:spLocks noGrp="1"/>
+          </p:cNvSpPr>
+          <p:nvPr>
+            <p:ph type="hdr" sz="quarter"/>
+          </p:nvPr>
+        </p:nvSpPr>
+        <p:spPr>
+          <a:xfrm>
+            <a:off x="0" y="0"/>
+            <a:ext cx="2971800" cy="458788"/>
+          </a:xfrm>
+          <a:prstGeom prst="rect">
+            <a:avLst/>
+          </a:prstGeom>
+        </p:spPr>
+        <p:txBody>
+          <a:bodyPr vert="horz" lIns="91440" tIns="45720" rIns="91440" bIns="45720" rtlCol="0"/>
+          <a:lstStyle>
+            <a:lvl1pPr algn="l">
+              <a:defRPr sz="1200"/>
+            </a:lvl1pPr>
+          </a:lstStyle>
+          <a:p>
+            <a:endParaRPr lang="en-US"/>
+          </a:p>
+        </p:txBody>
+      </p:sp>
+      <p:sp>
+        <p:nvSpPr>
+          <p:cNvPr id="3" name="Date Placeholder 2"/>
+          <p:cNvSpPr>
+            <a:spLocks noGrp="1"/>
+          </p:cNvSpPr>
+          <p:nvPr>
+            <p:ph type="dt" idx="1"/>
+          </p:nvPr>
+        </p:nvSpPr>
+        <p:spPr>
+          <a:xfrm>
+            <a:off x="3884613" y="0"/>
+            <a:ext cx="2971800" cy="458788"/>
+          </a:xfrm>
+          <a:prstGeom prst="rect">
+            <a:avLst/>
+          </a:prstGeom>
+        </p:spPr>
+        <p:txBody>
+          <a:bodyPr vert="horz" lIns="91440" tIns="45720" rIns="91440" bIns="45720" rtlCol="0"/>
+          <a:lstStyle>
+            <a:lvl1pPr algn="r">
+              <a:defRPr sz="1200"/>
+            </a:lvl1pPr>
+          </a:lstStyle>
+          <a:p>
+            <a:fld id="{FEEF7981-4104-4A44-B089-903C5ACCC29C}" type="datetimeFigureOut">
+              <a:rPr lang="en-US" smtClean="0"/>
+              <a:t>2/15/26</a:t>
+            </a:fld>
+            <a:endParaRPr lang="en-US"/>
+          </a:p>
+        </p:txBody>
+      </p:sp>
+      <p:sp>
+        <p:nvSpPr>
+          <p:cNvPr id="4" name="Slide Image Placeholder 3"/>
+          <p:cNvSpPr>
+            <a:spLocks noGrp="1" noRot="1" noChangeAspect="1"/>
+          </p:cNvSpPr>
+          <p:nvPr>
+            <p:ph type="sldImg" idx="2"/>
+          </p:nvPr>
+        </p:nvSpPr>
+        <p:spPr>
+          <a:xfrm>
+            <a:off x="1371600" y="1143000"/>
+            <a:ext cx="4114800" cy="3086100"/>
+          </a:xfrm>
+          <a:prstGeom prst="rect">
+            <a:avLst/>
+          </a:prstGeom>
+          <a:noFill/>
+          <a:ln w="12700">
+            <a:solidFill>
+              <a:prstClr val="black"/>
+            </a:solidFill>
+          </a:ln>
+        </p:spPr>
+        <p:txBody>
+          <a:bodyPr vert="horz" lIns="91440" tIns="45720" rIns="91440" bIns="45720" rtlCol="0" anchor="ctr"/>
+          <a:lstStyle/>
+          <a:p>
+            <a:endParaRPr lang="en-US"/>
+          </a:p>
+        </p:txBody>
+      </p:sp>
+      <p:sp>
+        <p:nvSpPr>
+          <p:cNvPr id="5" name="Notes Placeholder 4"/>
+          <p:cNvSpPr>
+            <a:spLocks noGrp="1"/>
+          </p:cNvSpPr>
+          <p:nvPr>
+            <p:ph type="body" sz="quarter" idx="3"/>
+          </p:nvPr>
+        </p:nvSpPr>
+        <p:spPr>
+          <a:xfrm>
+            <a:off x="685800" y="4400550"/>
+            <a:ext cx="5486400" cy="3600450"/>
+          </a:xfrm>
+          <a:prstGeom prst="rect">
+            <a:avLst/>
+          </a:prstGeom>
+        </p:spPr>
+        <p:txBody>
+          <a:bodyPr vert="horz" lIns="91440" tIns="45720" rIns="91440" bIns="45720" rtlCol="0"/>
+          <a:lstStyle/>
+          <a:p>
+            <a:pPr lvl="0"/>
+            <a:r>
+              <a:rPr lang="en-US"/>
+              <a:t>Click to edit Master text styles</a:t>
+            </a:r>
+          </a:p>
+          <a:p>
+            <a:pPr lvl="1"/>
+            <a:r>
+              <a:rPr lang="en-US"/>
+              <a:t>Second level</a:t>
+            </a:r>
+          </a:p>
+          <a:p>
+            <a:pPr lvl="2"/>
+            <a:r>
+              <a:rPr lang="en-US"/>
+              <a:t>Third level</a:t>
+            </a:r>
+          </a:p>
+          <a:p>
+            <a:pPr lvl="3"/>
+            <a:r>
+              <a:rPr lang="en-US"/>
+              <a:t>Fourth level</a:t>
+            </a:r>
+          </a:p>
+          <a:p>
+            <a:pPr lvl="4"/>
+            <a:r>
+              <a:rPr lang="en-US"/>
+              <a:t>Fifth level</a:t>
+            </a:r>
+          </a:p>
+        </p:txBody>
+      </p:sp>
+      <p:sp>
+        <p:nvSpPr>
+          <p:cNvPr id="6" name="Footer Placeholder 5"/>
+          <p:cNvSpPr>
+            <a:spLocks noGrp="1"/>
+          </p:cNvSpPr>
+          <p:nvPr>
+            <p:ph type="ftr" sz="quarter" idx="4"/>
+          </p:nvPr>
+        </p:nvSpPr>
+        <p:spPr>
+          <a:xfrm>
+            <a:off x="0" y="8685213"/>
+            <a:ext cx="2971800" cy="458787"/>
+          </a:xfrm>
+          <a:prstGeom prst="rect">
+            <a:avLst/>
+          </a:prstGeom>
+        </p:spPr>
+        <p:txBody>
+          <a:bodyPr vert="horz" lIns="91440" tIns="45720" rIns="91440" bIns="45720" rtlCol="0" anchor="b"/>
+          <a:lstStyle>
+            <a:lvl1pPr algn="l">
+              <a:defRPr sz="1200"/>
+            </a:lvl1pPr>
+          </a:lstStyle>
+          <a:p>
+            <a:endParaRPr lang="en-US"/>
+          </a:p>
+        </p:txBody>
+      </p:sp>
+      <p:sp>
+        <p:nvSpPr>
+          <p:cNvPr id="7" name="Slide Number Placeholder 6"/>
+          <p:cNvSpPr>
+            <a:spLocks noGrp="1"/>
+          </p:cNvSpPr>
+          <p:nvPr>
+            <p:ph type="sldNum" sz="quarter" idx="5"/>
+          </p:nvPr>
+        </p:nvSpPr>
+        <p:spPr>
+          <a:xfrm>
+            <a:off x="3884613" y="8685213"/>
+            <a:ext cx="2971800" cy="458787"/>
+          </a:xfrm>
+          <a:prstGeom prst="rect">
+            <a:avLst/>
+          </a:prstGeom>
+        </p:spPr>
+        <p:txBody>
+          <a:bodyPr vert="horz" lIns="91440" tIns="45720" rIns="91440" bIns="45720" rtlCol="0" anchor="b"/>
+          <a:lstStyle>
+            <a:lvl1pPr algn="r">
+              <a:defRPr sz="1200"/>
+            </a:lvl1pPr>
+          </a:lstStyle>
+          <a:p>
+            <a:fld id="{179C0A28-BD2D-1A49-A30E-86847D45FDDA}" type="slidenum">
+              <a:rPr lang="en-US" smtClean="0"/>
+              <a:t>‹#›</a:t>
+            </a:fld>
+            <a:endParaRPr lang="en-US"/>
+          </a:p>
+        </p:txBody>
+      </p:sp>
+    </p:spTree>
+    <p:extLst>
+      <p:ext uri="{BB962C8B-B14F-4D97-AF65-F5344CB8AC3E}">
+        <p14:creationId xmlns:p14="http://schemas.microsoft.com/office/powerpoint/2010/main" val="3646776353"/>
+      </p:ext>
+    </p:extLst>
+  </p:cSld>
+  <p:clrMap bg1="lt1" tx1="dk1" bg2="lt2" tx2="dk2" accent1="accent1" accent2="accent2" accent3="accent3" accent4="accent4" accent5="accent5" accent6="accent6" hlink="hlink" folHlink="folHlink"/>
+  <p:notesStyle>
+    <a:lvl1pPr marL="0" algn="l" defTabSz="914400" rtl="0" eaLnBrk="1" latinLnBrk="0" hangingPunct="1">
+      <a:defRPr sz="1200" kern="1200">
+        <a:solidFill>
+          <a:schemeClr val="tx1"/>
+        </a:solidFill>
+        <a:latin typeface="+mn-lt"/>
+        <a:ea typeface="+mn-ea"/>
+        <a:cs typeface="+mn-cs"/>
+      </a:defRPr>
+    </a:lvl1pPr>
+    <a:lvl2pPr marL="457200" algn="l" defTabSz="914400" rtl="0" eaLnBrk="1" latinLnBrk="0" hangingPunct="1">
+      <a:defRPr sz="1200" kern="1200">
+        <a:solidFill>
+          <a:schemeClr val="tx1"/>
+        </a:solidFill>
+        <a:latin typeface="+mn-lt"/>
+        <a:ea typeface="+mn-ea"/>
+        <a:cs typeface="+mn-cs"/>
+      </a:defRPr>
+    </a:lvl2pPr>
+    <a:lvl3pPr marL="914400" algn="l" defTabSz="914400" rtl="0" eaLnBrk="1" latinLnBrk="0" hangingPunct="1">
+      <a:defRPr sz="1200" kern="1200">
+        <a:solidFill>
+          <a:schemeClr val="tx1"/>
+        </a:solidFill>
+        <a:latin typeface="+mn-lt"/>
+        <a:ea typeface="+mn-ea"/>
+        <a:cs typeface="+mn-cs"/>
+      </a:defRPr>
+    </a:lvl3pPr>
+    <a:lvl4pPr marL="1371600" algn="l" defTabSz="914400" rtl="0" eaLnBrk="1" latinLnBrk="0" hangingPunct="1">
+      <a:defRPr sz="1200" kern="1200">
+        <a:solidFill>
+          <a:schemeClr val="tx1"/>
+        </a:solidFill>
+        <a:latin typeface="+mn-lt"/>
+        <a:ea typeface="+mn-ea"/>
+        <a:cs typeface="+mn-cs"/>
+      </a:defRPr>
+    </a:lvl4pPr>
+    <a:lvl5pPr marL="1828800" algn="l" defTabSz="914400" rtl="0" eaLnBrk="1" latinLnBrk="0" hangingPunct="1">
+      <a:defRPr sz="1200" kern="1200">
+        <a:solidFill>
+          <a:schemeClr val="tx1"/>
+        </a:solidFill>
+        <a:latin typeface="+mn-lt"/>
+        <a:ea typeface="+mn-ea"/>
+        <a:cs typeface="+mn-cs"/>
+      </a:defRPr>
+    </a:lvl5pPr>
+    <a:lvl6pPr marL="2286000" algn="l" defTabSz="914400" rtl="0" eaLnBrk="1" latinLnBrk="0" hangingPunct="1">
+      <a:defRPr sz="1200" kern="1200">
+        <a:solidFill>
+          <a:schemeClr val="tx1"/>
+        </a:solidFill>
+        <a:latin typeface="+mn-lt"/>
+        <a:ea typeface="+mn-ea"/>
+        <a:cs typeface="+mn-cs"/>
+      </a:defRPr>
+    </a:lvl6pPr>
+    <a:lvl7pPr marL="2743200" algn="l" defTabSz="914400" rtl="0" eaLnBrk="1" latinLnBrk="0" hangingPunct="1">
+      <a:defRPr sz="1200" kern="1200">
+        <a:solidFill>
+          <a:schemeClr val="tx1"/>
+        </a:solidFill>
+        <a:latin typeface="+mn-lt"/>
+        <a:ea typeface="+mn-ea"/>
+        <a:cs typeface="+mn-cs"/>
+      </a:defRPr>
+    </a:lvl7pPr>
+    <a:lvl8pPr marL="3200400" algn="l" defTabSz="914400" rtl="0" eaLnBrk="1" latinLnBrk="0" hangingPunct="1">
+      <a:defRPr sz="1200" kern="1200">
+        <a:solidFill>
+          <a:schemeClr val="tx1"/>
+        </a:solidFill>
+        <a:latin typeface="+mn-lt"/>
+        <a:ea typeface="+mn-ea"/>
+        <a:cs typeface="+mn-cs"/>
+      </a:defRPr>
+    </a:lvl8pPr>
+    <a:lvl9pPr marL="3657600" algn="l" defTabSz="914400" rtl="0" eaLnBrk="1" latinLnBrk="0" hangingPunct="1">
+      <a:defRPr sz="1200" kern="1200">
+        <a:solidFill>
+          <a:schemeClr val="tx1"/>
+        </a:solidFill>
+        <a:latin typeface="+mn-lt"/>
+        <a:ea typeface="+mn-ea"/>
+        <a:cs typeface="+mn-cs"/>
+      </a:defRPr>
+    </a:lvl9pPr>
+  </p:notesStyle>
+</p:notesMaster>
+</file>
+
+<file path=ppt/notesSlides/notesSlide1.xml><?xml version="1.0" encoding="utf-8"?>
+<p:notes xmlns:a="http://schemas.openxmlformats.org/drawingml/2006/main" xmlns:r="http://schemas.openxmlformats.org/officeDocument/2006/relationships" xmlns:p="http://schemas.openxmlformats.org/presentationml/2006/main">
+  <p:cSld>
+    <p:spTree>
+      <p:nvGrpSpPr>
+        <p:cNvPr id="1" name=""/>
+        <p:cNvGrpSpPr/>
+        <p:nvPr/>
+      </p:nvGrpSpPr>
+      <p:grpSpPr>
+        <a:xfrm>
+          <a:off x="0" y="0"/>
+          <a:ext cx="0" cy="0"/>
+          <a:chOff x="0" y="0"/>
+          <a:chExt cx="0" cy="0"/>
+        </a:xfrm>
+      </p:grpSpPr>
+      <p:sp>
+        <p:nvSpPr>
+          <p:cNvPr id="2" name="Slide Image Placeholder 1"/>
+          <p:cNvSpPr>
+            <a:spLocks noGrp="1" noRot="1" noChangeAspect="1"/>
+          </p:cNvSpPr>
+          <p:nvPr>
+            <p:ph type="sldImg"/>
+          </p:nvPr>
+        </p:nvSpPr>
+        <p:spPr/>
+      </p:sp>
+      <p:sp>
+        <p:nvSpPr>
+          <p:cNvPr id="3" name="Notes Placeholder 2"/>
+          <p:cNvSpPr>
+            <a:spLocks noGrp="1"/>
+          </p:cNvSpPr>
+          <p:nvPr>
+            <p:ph type="body" idx="1"/>
+          </p:nvPr>
+        </p:nvSpPr>
+        <p:spPr/>
+        <p:txBody>
+          <a:bodyPr/>
+          <a:lstStyle/>
+          <a:p>
+            <a:endParaRPr lang="en-US" dirty="0"/>
+          </a:p>
+        </p:txBody>
+      </p:sp>
+      <p:sp>
+        <p:nvSpPr>
+          <p:cNvPr id="4" name="Slide Number Placeholder 3"/>
+          <p:cNvSpPr>
+            <a:spLocks noGrp="1"/>
+          </p:cNvSpPr>
+          <p:nvPr>
+            <p:ph type="sldNum" sz="quarter" idx="5"/>
+          </p:nvPr>
+        </p:nvSpPr>
+        <p:spPr/>
+        <p:txBody>
+          <a:bodyPr/>
+          <a:lstStyle/>
+          <a:p>
+            <a:fld id="{179C0A28-BD2D-1A49-A30E-86847D45FDDA}" type="slidenum">
+              <a:rPr lang="en-US" smtClean="0"/>
+              <a:t>2</a:t>
+            </a:fld>
+            <a:endParaRPr lang="en-US"/>
+          </a:p>
+        </p:txBody>
+      </p:sp>
+    </p:spTree>
+    <p:extLst>
+      <p:ext uri="{BB962C8B-B14F-4D97-AF65-F5344CB8AC3E}">
+        <p14:creationId xmlns:p14="http://schemas.microsoft.com/office/powerpoint/2010/main" val="1821707310"/>
+      </p:ext>
+    </p:extLst>
+  </p:cSld>
+  <p:clrMapOvr>
+    <a:masterClrMapping/>
+  </p:clrMapOvr>
+</p:notes>
 </file>
 
 <file path=ppt/slideLayouts/slideLayout1.xml><?xml version="1.0" encoding="utf-8"?>
@@ -238,7 +680,7 @@
           <a:p>
             <a:fld id="{0CEA8DB8-EBFA-8C4D-8FF6-BC8323702808}" type="datetimeFigureOut">
               <a:rPr lang="en-US" smtClean="0"/>
-              <a:t>2/22/24</a:t>
+              <a:t>2/15/26</a:t>
             </a:fld>
             <a:endParaRPr lang="en-US"/>
           </a:p>
@@ -408,7 +850,7 @@
           <a:p>
             <a:fld id="{0CEA8DB8-EBFA-8C4D-8FF6-BC8323702808}" type="datetimeFigureOut">
               <a:rPr lang="en-US" smtClean="0"/>
-              <a:t>2/22/24</a:t>
+              <a:t>2/15/26</a:t>
             </a:fld>
             <a:endParaRPr lang="en-US"/>
           </a:p>
@@ -588,7 +1030,7 @@
           <a:p>
             <a:fld id="{0CEA8DB8-EBFA-8C4D-8FF6-BC8323702808}" type="datetimeFigureOut">
               <a:rPr lang="en-US" smtClean="0"/>
-              <a:t>2/22/24</a:t>
+              <a:t>2/15/26</a:t>
             </a:fld>
             <a:endParaRPr lang="en-US"/>
           </a:p>
@@ -758,7 +1200,7 @@
           <a:p>
             <a:fld id="{0CEA8DB8-EBFA-8C4D-8FF6-BC8323702808}" type="datetimeFigureOut">
               <a:rPr lang="en-US" smtClean="0"/>
-              <a:t>2/22/24</a:t>
+              <a:t>2/15/26</a:t>
             </a:fld>
             <a:endParaRPr lang="en-US"/>
           </a:p>
@@ -1002,7 +1444,7 @@
           <a:p>
             <a:fld id="{0CEA8DB8-EBFA-8C4D-8FF6-BC8323702808}" type="datetimeFigureOut">
               <a:rPr lang="en-US" smtClean="0"/>
-              <a:t>2/22/24</a:t>
+              <a:t>2/15/26</a:t>
             </a:fld>
             <a:endParaRPr lang="en-US"/>
           </a:p>
@@ -1234,7 +1676,7 @@
           <a:p>
             <a:fld id="{0CEA8DB8-EBFA-8C4D-8FF6-BC8323702808}" type="datetimeFigureOut">
               <a:rPr lang="en-US" smtClean="0"/>
-              <a:t>2/22/24</a:t>
+              <a:t>2/15/26</a:t>
             </a:fld>
             <a:endParaRPr lang="en-US"/>
           </a:p>
@@ -1601,7 +2043,7 @@
           <a:p>
             <a:fld id="{0CEA8DB8-EBFA-8C4D-8FF6-BC8323702808}" type="datetimeFigureOut">
               <a:rPr lang="en-US" smtClean="0"/>
-              <a:t>2/22/24</a:t>
+              <a:t>2/15/26</a:t>
             </a:fld>
             <a:endParaRPr lang="en-US"/>
           </a:p>
@@ -1719,7 +2161,7 @@
           <a:p>
             <a:fld id="{0CEA8DB8-EBFA-8C4D-8FF6-BC8323702808}" type="datetimeFigureOut">
               <a:rPr lang="en-US" smtClean="0"/>
-              <a:t>2/22/24</a:t>
+              <a:t>2/15/26</a:t>
             </a:fld>
             <a:endParaRPr lang="en-US"/>
           </a:p>
@@ -1814,7 +2256,7 @@
           <a:p>
             <a:fld id="{0CEA8DB8-EBFA-8C4D-8FF6-BC8323702808}" type="datetimeFigureOut">
               <a:rPr lang="en-US" smtClean="0"/>
-              <a:t>2/22/24</a:t>
+              <a:t>2/15/26</a:t>
             </a:fld>
             <a:endParaRPr lang="en-US"/>
           </a:p>
@@ -2091,7 +2533,7 @@
           <a:p>
             <a:fld id="{0CEA8DB8-EBFA-8C4D-8FF6-BC8323702808}" type="datetimeFigureOut">
               <a:rPr lang="en-US" smtClean="0"/>
-              <a:t>2/22/24</a:t>
+              <a:t>2/15/26</a:t>
             </a:fld>
             <a:endParaRPr lang="en-US"/>
           </a:p>
@@ -2348,7 +2790,7 @@
           <a:p>
             <a:fld id="{0CEA8DB8-EBFA-8C4D-8FF6-BC8323702808}" type="datetimeFigureOut">
               <a:rPr lang="en-US" smtClean="0"/>
-              <a:t>2/22/24</a:t>
+              <a:t>2/15/26</a:t>
             </a:fld>
             <a:endParaRPr lang="en-US"/>
           </a:p>
@@ -2561,7 +3003,7 @@
           <a:p>
             <a:fld id="{0CEA8DB8-EBFA-8C4D-8FF6-BC8323702808}" type="datetimeFigureOut">
               <a:rPr lang="en-US" smtClean="0"/>
-              <a:t>2/22/24</a:t>
+              <a:t>2/15/26</a:t>
             </a:fld>
             <a:endParaRPr lang="en-US"/>
           </a:p>
@@ -3618,6 +4060,1790 @@
 </p:sld>
 </file>
 
+<file path=ppt/slides/slide2.xml><?xml version="1.0" encoding="utf-8"?>
+<p:sld xmlns:a="http://schemas.openxmlformats.org/drawingml/2006/main" xmlns:r="http://schemas.openxmlformats.org/officeDocument/2006/relationships" xmlns:p="http://schemas.openxmlformats.org/presentationml/2006/main">
+  <p:cSld>
+    <p:spTree>
+      <p:nvGrpSpPr>
+        <p:cNvPr id="1" name=""/>
+        <p:cNvGrpSpPr/>
+        <p:nvPr/>
+      </p:nvGrpSpPr>
+      <p:grpSpPr>
+        <a:xfrm>
+          <a:off x="0" y="0"/>
+          <a:ext cx="0" cy="0"/>
+          <a:chOff x="0" y="0"/>
+          <a:chExt cx="0" cy="0"/>
+        </a:xfrm>
+      </p:grpSpPr>
+      <p:sp>
+        <p:nvSpPr>
+          <p:cNvPr id="4" name="Rectangle 3">
+            <a:extLst>
+              <a:ext uri="{FF2B5EF4-FFF2-40B4-BE49-F238E27FC236}">
+                <a16:creationId xmlns:a16="http://schemas.microsoft.com/office/drawing/2014/main" id="{91E890F2-EE6B-27EA-4609-2F13F00AC302}"/>
+              </a:ext>
+            </a:extLst>
+          </p:cNvPr>
+          <p:cNvSpPr/>
+          <p:nvPr/>
+        </p:nvSpPr>
+        <p:spPr>
+          <a:xfrm>
+            <a:off x="700542" y="1876527"/>
+            <a:ext cx="1790298" cy="462012"/>
+          </a:xfrm>
+          <a:prstGeom prst="rect">
+            <a:avLst/>
+          </a:prstGeom>
+        </p:spPr>
+        <p:style>
+          <a:lnRef idx="2">
+            <a:schemeClr val="accent1">
+              <a:shade val="15000"/>
+            </a:schemeClr>
+          </a:lnRef>
+          <a:fillRef idx="1">
+            <a:schemeClr val="accent1"/>
+          </a:fillRef>
+          <a:effectRef idx="0">
+            <a:schemeClr val="accent1"/>
+          </a:effectRef>
+          <a:fontRef idx="minor">
+            <a:schemeClr val="lt1"/>
+          </a:fontRef>
+        </p:style>
+        <p:txBody>
+          <a:bodyPr rtlCol="0" anchor="ctr"/>
+          <a:lstStyle/>
+          <a:p>
+            <a:pPr algn="ctr"/>
+            <a:r>
+              <a:rPr lang="en-US" sz="1400" dirty="0"/>
+              <a:t>Diagram </a:t>
+            </a:r>
+            <a:r>
+              <a:rPr lang="en-US" sz="1400" dirty="0" err="1"/>
+              <a:t>json</a:t>
+            </a:r>
+            <a:r>
+              <a:rPr lang="en-US" sz="1400" dirty="0"/>
+              <a:t> (Pathway - normal)</a:t>
+            </a:r>
+          </a:p>
+        </p:txBody>
+      </p:sp>
+      <p:sp>
+        <p:nvSpPr>
+          <p:cNvPr id="5" name="Rectangle 4">
+            <a:extLst>
+              <a:ext uri="{FF2B5EF4-FFF2-40B4-BE49-F238E27FC236}">
+                <a16:creationId xmlns:a16="http://schemas.microsoft.com/office/drawing/2014/main" id="{C0B41816-8242-04D7-DD1E-8B3D30BF15A3}"/>
+              </a:ext>
+            </a:extLst>
+          </p:cNvPr>
+          <p:cNvSpPr/>
+          <p:nvPr/>
+        </p:nvSpPr>
+        <p:spPr>
+          <a:xfrm>
+            <a:off x="3909727" y="3458541"/>
+            <a:ext cx="1790298" cy="462012"/>
+          </a:xfrm>
+          <a:prstGeom prst="rect">
+            <a:avLst/>
+          </a:prstGeom>
+        </p:spPr>
+        <p:style>
+          <a:lnRef idx="2">
+            <a:schemeClr val="accent2">
+              <a:shade val="15000"/>
+            </a:schemeClr>
+          </a:lnRef>
+          <a:fillRef idx="1">
+            <a:schemeClr val="accent2"/>
+          </a:fillRef>
+          <a:effectRef idx="0">
+            <a:schemeClr val="accent2"/>
+          </a:effectRef>
+          <a:fontRef idx="minor">
+            <a:schemeClr val="lt1"/>
+          </a:fontRef>
+        </p:style>
+        <p:txBody>
+          <a:bodyPr rtlCol="0" anchor="ctr"/>
+          <a:lstStyle/>
+          <a:p>
+            <a:pPr algn="ctr"/>
+            <a:r>
+              <a:rPr lang="en-US" sz="1400" dirty="0"/>
+              <a:t>Diagram </a:t>
+            </a:r>
+            <a:r>
+              <a:rPr lang="en-US" sz="1400" dirty="0" err="1"/>
+              <a:t>json</a:t>
+            </a:r>
+            <a:r>
+              <a:rPr lang="en-US" sz="1400" dirty="0"/>
+              <a:t> (</a:t>
+            </a:r>
+            <a:r>
+              <a:rPr lang="en-US" sz="1400" dirty="0" err="1"/>
+              <a:t>PathwayDiagram</a:t>
+            </a:r>
+            <a:r>
+              <a:rPr lang="en-US" sz="1400" dirty="0"/>
+              <a:t>)</a:t>
+            </a:r>
+          </a:p>
+        </p:txBody>
+      </p:sp>
+      <p:sp>
+        <p:nvSpPr>
+          <p:cNvPr id="6" name="Rectangle 5">
+            <a:extLst>
+              <a:ext uri="{FF2B5EF4-FFF2-40B4-BE49-F238E27FC236}">
+                <a16:creationId xmlns:a16="http://schemas.microsoft.com/office/drawing/2014/main" id="{BCF5C22A-B799-D49E-337F-ECCA8D68F1B7}"/>
+              </a:ext>
+            </a:extLst>
+          </p:cNvPr>
+          <p:cNvSpPr/>
+          <p:nvPr/>
+        </p:nvSpPr>
+        <p:spPr>
+          <a:xfrm>
+            <a:off x="3616997" y="1876526"/>
+            <a:ext cx="1790298" cy="462012"/>
+          </a:xfrm>
+          <a:prstGeom prst="rect">
+            <a:avLst/>
+          </a:prstGeom>
+        </p:spPr>
+        <p:style>
+          <a:lnRef idx="2">
+            <a:schemeClr val="accent1">
+              <a:shade val="15000"/>
+            </a:schemeClr>
+          </a:lnRef>
+          <a:fillRef idx="1">
+            <a:schemeClr val="accent1"/>
+          </a:fillRef>
+          <a:effectRef idx="0">
+            <a:schemeClr val="accent1"/>
+          </a:effectRef>
+          <a:fontRef idx="minor">
+            <a:schemeClr val="lt1"/>
+          </a:fontRef>
+        </p:style>
+        <p:txBody>
+          <a:bodyPr rtlCol="0" anchor="ctr"/>
+          <a:lstStyle/>
+          <a:p>
+            <a:pPr algn="ctr"/>
+            <a:r>
+              <a:rPr lang="en-US" sz="1400" dirty="0"/>
+              <a:t>Diagram </a:t>
+            </a:r>
+            <a:r>
+              <a:rPr lang="en-US" sz="1400" dirty="0" err="1"/>
+              <a:t>json</a:t>
+            </a:r>
+            <a:r>
+              <a:rPr lang="en-US" sz="1400" dirty="0"/>
+              <a:t> (Pathway - disease)</a:t>
+            </a:r>
+          </a:p>
+        </p:txBody>
+      </p:sp>
+      <p:sp>
+        <p:nvSpPr>
+          <p:cNvPr id="7" name="Rectangle 6">
+            <a:extLst>
+              <a:ext uri="{FF2B5EF4-FFF2-40B4-BE49-F238E27FC236}">
+                <a16:creationId xmlns:a16="http://schemas.microsoft.com/office/drawing/2014/main" id="{7BF0579E-94DE-712A-8ADA-13EB1DAFD305}"/>
+              </a:ext>
+            </a:extLst>
+          </p:cNvPr>
+          <p:cNvSpPr/>
+          <p:nvPr/>
+        </p:nvSpPr>
+        <p:spPr>
+          <a:xfrm>
+            <a:off x="2155562" y="5997976"/>
+            <a:ext cx="1790298" cy="462012"/>
+          </a:xfrm>
+          <a:prstGeom prst="rect">
+            <a:avLst/>
+          </a:prstGeom>
+        </p:spPr>
+        <p:style>
+          <a:lnRef idx="2">
+            <a:schemeClr val="accent2">
+              <a:shade val="15000"/>
+            </a:schemeClr>
+          </a:lnRef>
+          <a:fillRef idx="1">
+            <a:schemeClr val="accent2"/>
+          </a:fillRef>
+          <a:effectRef idx="0">
+            <a:schemeClr val="accent2"/>
+          </a:effectRef>
+          <a:fontRef idx="minor">
+            <a:schemeClr val="lt1"/>
+          </a:fontRef>
+        </p:style>
+        <p:txBody>
+          <a:bodyPr rtlCol="0" anchor="ctr"/>
+          <a:lstStyle/>
+          <a:p>
+            <a:pPr algn="ctr"/>
+            <a:r>
+              <a:rPr lang="en-US" sz="1400" dirty="0" err="1"/>
+              <a:t>Cytoscape.js</a:t>
+            </a:r>
+            <a:r>
+              <a:rPr lang="en-US" sz="1400" dirty="0"/>
+              <a:t> </a:t>
+            </a:r>
+            <a:r>
+              <a:rPr lang="en-US" sz="1400" dirty="0" err="1"/>
+              <a:t>json</a:t>
+            </a:r>
+            <a:r>
+              <a:rPr lang="en-US" sz="1400" dirty="0"/>
+              <a:t> (</a:t>
+            </a:r>
+            <a:r>
+              <a:rPr lang="en-US" sz="1400" dirty="0" err="1"/>
+              <a:t>PathwayDiagram</a:t>
+            </a:r>
+            <a:r>
+              <a:rPr lang="en-US" sz="1400" dirty="0"/>
+              <a:t>)</a:t>
+            </a:r>
+          </a:p>
+        </p:txBody>
+      </p:sp>
+      <p:sp>
+        <p:nvSpPr>
+          <p:cNvPr id="8" name="Rectangle 7">
+            <a:extLst>
+              <a:ext uri="{FF2B5EF4-FFF2-40B4-BE49-F238E27FC236}">
+                <a16:creationId xmlns:a16="http://schemas.microsoft.com/office/drawing/2014/main" id="{6BF2F5B3-6AD7-A8C9-9A6F-C6B79EE04F31}"/>
+              </a:ext>
+            </a:extLst>
+          </p:cNvPr>
+          <p:cNvSpPr/>
+          <p:nvPr/>
+        </p:nvSpPr>
+        <p:spPr>
+          <a:xfrm>
+            <a:off x="9810855" y="3796499"/>
+            <a:ext cx="2098307" cy="1647521"/>
+          </a:xfrm>
+          <a:prstGeom prst="rect">
+            <a:avLst/>
+          </a:prstGeom>
+        </p:spPr>
+        <p:style>
+          <a:lnRef idx="2">
+            <a:schemeClr val="accent3">
+              <a:shade val="15000"/>
+            </a:schemeClr>
+          </a:lnRef>
+          <a:fillRef idx="1">
+            <a:schemeClr val="accent3"/>
+          </a:fillRef>
+          <a:effectRef idx="0">
+            <a:schemeClr val="accent3"/>
+          </a:effectRef>
+          <a:fontRef idx="minor">
+            <a:schemeClr val="lt1"/>
+          </a:fontRef>
+        </p:style>
+        <p:txBody>
+          <a:bodyPr rtlCol="0" anchor="ctr"/>
+          <a:lstStyle/>
+          <a:p>
+            <a:pPr algn="ctr"/>
+            <a:r>
+              <a:rPr lang="en-US" dirty="0" err="1"/>
+              <a:t>PathwayDiagram</a:t>
+            </a:r>
+            <a:r>
+              <a:rPr lang="en-US" dirty="0"/>
+              <a:t> Widget (</a:t>
+            </a:r>
+            <a:r>
+              <a:rPr lang="en-US" dirty="0" err="1"/>
+              <a:t>cytoscape.js</a:t>
+            </a:r>
+            <a:r>
+              <a:rPr lang="en-US" dirty="0"/>
+              <a:t>)</a:t>
+            </a:r>
+          </a:p>
+        </p:txBody>
+      </p:sp>
+      <p:sp>
+        <p:nvSpPr>
+          <p:cNvPr id="9" name="Rectangle 8">
+            <a:extLst>
+              <a:ext uri="{FF2B5EF4-FFF2-40B4-BE49-F238E27FC236}">
+                <a16:creationId xmlns:a16="http://schemas.microsoft.com/office/drawing/2014/main" id="{9BD2B4B0-6F4E-D09A-9901-DCD0A7B658D9}"/>
+              </a:ext>
+            </a:extLst>
+          </p:cNvPr>
+          <p:cNvSpPr/>
+          <p:nvPr/>
+        </p:nvSpPr>
+        <p:spPr>
+          <a:xfrm>
+            <a:off x="500016" y="1580543"/>
+            <a:ext cx="5592278" cy="4138900"/>
+          </a:xfrm>
+          <a:prstGeom prst="rect">
+            <a:avLst/>
+          </a:prstGeom>
+          <a:noFill/>
+        </p:spPr>
+        <p:style>
+          <a:lnRef idx="2">
+            <a:schemeClr val="accent1">
+              <a:shade val="15000"/>
+            </a:schemeClr>
+          </a:lnRef>
+          <a:fillRef idx="1">
+            <a:schemeClr val="accent1"/>
+          </a:fillRef>
+          <a:effectRef idx="0">
+            <a:schemeClr val="accent1"/>
+          </a:effectRef>
+          <a:fontRef idx="minor">
+            <a:schemeClr val="lt1"/>
+          </a:fontRef>
+        </p:style>
+        <p:txBody>
+          <a:bodyPr rtlCol="0" anchor="ctr"/>
+          <a:lstStyle/>
+          <a:p>
+            <a:pPr algn="ctr"/>
+            <a:endParaRPr lang="en-US"/>
+          </a:p>
+        </p:txBody>
+      </p:sp>
+      <p:sp>
+        <p:nvSpPr>
+          <p:cNvPr id="10" name="Rectangle 9">
+            <a:extLst>
+              <a:ext uri="{FF2B5EF4-FFF2-40B4-BE49-F238E27FC236}">
+                <a16:creationId xmlns:a16="http://schemas.microsoft.com/office/drawing/2014/main" id="{11DF40F4-54BA-5731-E29E-AEFFF8A1EF8D}"/>
+              </a:ext>
+            </a:extLst>
+          </p:cNvPr>
+          <p:cNvSpPr/>
+          <p:nvPr/>
+        </p:nvSpPr>
+        <p:spPr>
+          <a:xfrm>
+            <a:off x="500016" y="5762517"/>
+            <a:ext cx="5592278" cy="976004"/>
+          </a:xfrm>
+          <a:prstGeom prst="rect">
+            <a:avLst/>
+          </a:prstGeom>
+          <a:noFill/>
+        </p:spPr>
+        <p:style>
+          <a:lnRef idx="2">
+            <a:schemeClr val="accent1">
+              <a:shade val="15000"/>
+            </a:schemeClr>
+          </a:lnRef>
+          <a:fillRef idx="1">
+            <a:schemeClr val="accent1"/>
+          </a:fillRef>
+          <a:effectRef idx="0">
+            <a:schemeClr val="accent1"/>
+          </a:effectRef>
+          <a:fontRef idx="minor">
+            <a:schemeClr val="lt1"/>
+          </a:fontRef>
+        </p:style>
+        <p:txBody>
+          <a:bodyPr rtlCol="0" anchor="ctr"/>
+          <a:lstStyle/>
+          <a:p>
+            <a:pPr algn="ctr"/>
+            <a:endParaRPr lang="en-US"/>
+          </a:p>
+        </p:txBody>
+      </p:sp>
+      <p:sp>
+        <p:nvSpPr>
+          <p:cNvPr id="11" name="Rounded Rectangle 10">
+            <a:extLst>
+              <a:ext uri="{FF2B5EF4-FFF2-40B4-BE49-F238E27FC236}">
+                <a16:creationId xmlns:a16="http://schemas.microsoft.com/office/drawing/2014/main" id="{7DB079ED-23D4-6A18-E2B9-7DA487EC6819}"/>
+              </a:ext>
+            </a:extLst>
+          </p:cNvPr>
+          <p:cNvSpPr/>
+          <p:nvPr/>
+        </p:nvSpPr>
+        <p:spPr>
+          <a:xfrm>
+            <a:off x="1326142" y="3586866"/>
+            <a:ext cx="1310641" cy="529389"/>
+          </a:xfrm>
+          <a:prstGeom prst="roundRect">
+            <a:avLst/>
+          </a:prstGeom>
+          <a:solidFill>
+            <a:schemeClr val="accent3">
+              <a:lumMod val="60000"/>
+              <a:lumOff val="40000"/>
+            </a:schemeClr>
+          </a:solidFill>
+        </p:spPr>
+        <p:style>
+          <a:lnRef idx="2">
+            <a:schemeClr val="accent1">
+              <a:shade val="15000"/>
+            </a:schemeClr>
+          </a:lnRef>
+          <a:fillRef idx="1">
+            <a:schemeClr val="accent1"/>
+          </a:fillRef>
+          <a:effectRef idx="0">
+            <a:schemeClr val="accent1"/>
+          </a:effectRef>
+          <a:fontRef idx="minor">
+            <a:schemeClr val="lt1"/>
+          </a:fontRef>
+        </p:style>
+        <p:txBody>
+          <a:bodyPr rtlCol="0" anchor="ctr"/>
+          <a:lstStyle/>
+          <a:p>
+            <a:pPr algn="ctr"/>
+            <a:r>
+              <a:rPr lang="en-US" sz="1200" dirty="0" err="1"/>
+              <a:t>PathwayDiagram</a:t>
+            </a:r>
+            <a:r>
+              <a:rPr lang="en-US" sz="1200" dirty="0"/>
+              <a:t> (instance)</a:t>
+            </a:r>
+          </a:p>
+        </p:txBody>
+      </p:sp>
+      <p:sp>
+        <p:nvSpPr>
+          <p:cNvPr id="12" name="TextBox 11">
+            <a:extLst>
+              <a:ext uri="{FF2B5EF4-FFF2-40B4-BE49-F238E27FC236}">
+                <a16:creationId xmlns:a16="http://schemas.microsoft.com/office/drawing/2014/main" id="{6FD8A747-ADED-AC86-0333-70F9A3D0AD7E}"/>
+              </a:ext>
+            </a:extLst>
+          </p:cNvPr>
+          <p:cNvSpPr txBox="1"/>
+          <p:nvPr/>
+        </p:nvSpPr>
+        <p:spPr>
+          <a:xfrm>
+            <a:off x="455223" y="5186194"/>
+            <a:ext cx="1535870" cy="461665"/>
+          </a:xfrm>
+          <a:prstGeom prst="rect">
+            <a:avLst/>
+          </a:prstGeom>
+          <a:noFill/>
+        </p:spPr>
+        <p:txBody>
+          <a:bodyPr wrap="none" rtlCol="0">
+            <a:spAutoFit/>
+          </a:bodyPr>
+          <a:lstStyle/>
+          <a:p>
+            <a:pPr algn="ctr"/>
+            <a:r>
+              <a:rPr lang="en-US" sz="1200" b="1" u="sng" dirty="0"/>
+              <a:t>Shared central space </a:t>
+            </a:r>
+          </a:p>
+          <a:p>
+            <a:pPr algn="ctr"/>
+            <a:r>
+              <a:rPr lang="en-US" sz="1200" b="1" u="sng" dirty="0"/>
+              <a:t>(</a:t>
+            </a:r>
+            <a:r>
+              <a:rPr lang="en-US" sz="1200" b="1" u="sng" dirty="0" err="1"/>
+              <a:t>db</a:t>
+            </a:r>
+            <a:r>
+              <a:rPr lang="en-US" sz="1200" b="1" u="sng" dirty="0"/>
+              <a:t> and files)</a:t>
+            </a:r>
+          </a:p>
+        </p:txBody>
+      </p:sp>
+      <p:sp>
+        <p:nvSpPr>
+          <p:cNvPr id="13" name="TextBox 12">
+            <a:extLst>
+              <a:ext uri="{FF2B5EF4-FFF2-40B4-BE49-F238E27FC236}">
+                <a16:creationId xmlns:a16="http://schemas.microsoft.com/office/drawing/2014/main" id="{1D7B215A-A499-3F9B-FB25-B675D5597447}"/>
+              </a:ext>
+            </a:extLst>
+          </p:cNvPr>
+          <p:cNvSpPr txBox="1"/>
+          <p:nvPr/>
+        </p:nvSpPr>
+        <p:spPr>
+          <a:xfrm>
+            <a:off x="455223" y="6421615"/>
+            <a:ext cx="1327543" cy="276999"/>
+          </a:xfrm>
+          <a:prstGeom prst="rect">
+            <a:avLst/>
+          </a:prstGeom>
+          <a:noFill/>
+        </p:spPr>
+        <p:txBody>
+          <a:bodyPr wrap="none" rtlCol="0">
+            <a:spAutoFit/>
+          </a:bodyPr>
+          <a:lstStyle/>
+          <a:p>
+            <a:r>
+              <a:rPr lang="en-US" sz="1200" b="1" u="sng" dirty="0"/>
+              <a:t>User staged space</a:t>
+            </a:r>
+          </a:p>
+        </p:txBody>
+      </p:sp>
+      <p:cxnSp>
+        <p:nvCxnSpPr>
+          <p:cNvPr id="15" name="Elbow Connector 14">
+            <a:extLst>
+              <a:ext uri="{FF2B5EF4-FFF2-40B4-BE49-F238E27FC236}">
+                <a16:creationId xmlns:a16="http://schemas.microsoft.com/office/drawing/2014/main" id="{D2E6BACA-DDA4-2956-D09A-96CA12DE942A}"/>
+              </a:ext>
+            </a:extLst>
+          </p:cNvPr>
+          <p:cNvCxnSpPr>
+            <a:cxnSpLocks/>
+            <a:stCxn id="8" idx="0"/>
+            <a:endCxn id="4" idx="0"/>
+          </p:cNvCxnSpPr>
+          <p:nvPr/>
+        </p:nvCxnSpPr>
+        <p:spPr>
+          <a:xfrm rot="16200000" flipV="1">
+            <a:off x="5267864" y="-1795646"/>
+            <a:ext cx="1919972" cy="9264318"/>
+          </a:xfrm>
+          <a:prstGeom prst="bentConnector3">
+            <a:avLst>
+              <a:gd name="adj1" fmla="val 111906"/>
+            </a:avLst>
+          </a:prstGeom>
+          <a:ln w="12700">
+            <a:headEnd type="triangle"/>
+            <a:tailEnd type="none"/>
+          </a:ln>
+        </p:spPr>
+        <p:style>
+          <a:lnRef idx="1">
+            <a:schemeClr val="accent1"/>
+          </a:lnRef>
+          <a:fillRef idx="0">
+            <a:schemeClr val="accent1"/>
+          </a:fillRef>
+          <a:effectRef idx="0">
+            <a:schemeClr val="accent1"/>
+          </a:effectRef>
+          <a:fontRef idx="minor">
+            <a:schemeClr val="tx1"/>
+          </a:fontRef>
+        </p:style>
+      </p:cxnSp>
+      <p:cxnSp>
+        <p:nvCxnSpPr>
+          <p:cNvPr id="16" name="Elbow Connector 15">
+            <a:extLst>
+              <a:ext uri="{FF2B5EF4-FFF2-40B4-BE49-F238E27FC236}">
+                <a16:creationId xmlns:a16="http://schemas.microsoft.com/office/drawing/2014/main" id="{F966A34C-D0E6-90E1-CF6A-B4FD4C7035B5}"/>
+              </a:ext>
+            </a:extLst>
+          </p:cNvPr>
+          <p:cNvCxnSpPr>
+            <a:cxnSpLocks/>
+            <a:stCxn id="8" idx="0"/>
+            <a:endCxn id="6" idx="3"/>
+          </p:cNvCxnSpPr>
+          <p:nvPr/>
+        </p:nvCxnSpPr>
+        <p:spPr>
+          <a:xfrm rot="16200000" flipV="1">
+            <a:off x="7289169" y="225659"/>
+            <a:ext cx="1688967" cy="5452714"/>
+          </a:xfrm>
+          <a:prstGeom prst="bentConnector2">
+            <a:avLst/>
+          </a:prstGeom>
+          <a:ln w="12700">
+            <a:headEnd type="triangle"/>
+            <a:tailEnd type="none"/>
+          </a:ln>
+        </p:spPr>
+        <p:style>
+          <a:lnRef idx="1">
+            <a:schemeClr val="accent1"/>
+          </a:lnRef>
+          <a:fillRef idx="0">
+            <a:schemeClr val="accent1"/>
+          </a:fillRef>
+          <a:effectRef idx="0">
+            <a:schemeClr val="accent1"/>
+          </a:effectRef>
+          <a:fontRef idx="minor">
+            <a:schemeClr val="tx1"/>
+          </a:fontRef>
+        </p:style>
+      </p:cxnSp>
+      <p:sp>
+        <p:nvSpPr>
+          <p:cNvPr id="19" name="TextBox 18">
+            <a:extLst>
+              <a:ext uri="{FF2B5EF4-FFF2-40B4-BE49-F238E27FC236}">
+                <a16:creationId xmlns:a16="http://schemas.microsoft.com/office/drawing/2014/main" id="{D564B580-8240-2C5A-C348-1B033203C4E4}"/>
+              </a:ext>
+            </a:extLst>
+          </p:cNvPr>
+          <p:cNvSpPr txBox="1"/>
+          <p:nvPr/>
+        </p:nvSpPr>
+        <p:spPr>
+          <a:xfrm>
+            <a:off x="7221033" y="1385158"/>
+            <a:ext cx="1504899" cy="276999"/>
+          </a:xfrm>
+          <a:prstGeom prst="rect">
+            <a:avLst/>
+          </a:prstGeom>
+          <a:noFill/>
+        </p:spPr>
+        <p:txBody>
+          <a:bodyPr wrap="none" rtlCol="0">
+            <a:spAutoFit/>
+          </a:bodyPr>
+          <a:lstStyle/>
+          <a:p>
+            <a:r>
+              <a:rPr lang="en-US" sz="1200" dirty="0"/>
+              <a:t>load normal pathway</a:t>
+            </a:r>
+          </a:p>
+        </p:txBody>
+      </p:sp>
+      <p:sp>
+        <p:nvSpPr>
+          <p:cNvPr id="20" name="TextBox 19">
+            <a:extLst>
+              <a:ext uri="{FF2B5EF4-FFF2-40B4-BE49-F238E27FC236}">
+                <a16:creationId xmlns:a16="http://schemas.microsoft.com/office/drawing/2014/main" id="{3B82D402-7329-CE36-4BFF-0D33CA845230}"/>
+              </a:ext>
+            </a:extLst>
+          </p:cNvPr>
+          <p:cNvSpPr txBox="1"/>
+          <p:nvPr/>
+        </p:nvSpPr>
+        <p:spPr>
+          <a:xfrm>
+            <a:off x="6640936" y="1844800"/>
+            <a:ext cx="2945329" cy="276999"/>
+          </a:xfrm>
+          <a:prstGeom prst="rect">
+            <a:avLst/>
+          </a:prstGeom>
+          <a:noFill/>
+        </p:spPr>
+        <p:txBody>
+          <a:bodyPr wrap="square" rtlCol="0">
+            <a:spAutoFit/>
+          </a:bodyPr>
+          <a:lstStyle/>
+          <a:p>
+            <a:r>
+              <a:rPr lang="en-US" sz="1200" dirty="0"/>
+              <a:t>load disease pathway (comparison enabled)</a:t>
+            </a:r>
+          </a:p>
+        </p:txBody>
+      </p:sp>
+      <p:sp>
+        <p:nvSpPr>
+          <p:cNvPr id="21" name="TextBox 20">
+            <a:extLst>
+              <a:ext uri="{FF2B5EF4-FFF2-40B4-BE49-F238E27FC236}">
+                <a16:creationId xmlns:a16="http://schemas.microsoft.com/office/drawing/2014/main" id="{D86611A6-C02A-D44E-28DC-3EF7CF69BD6E}"/>
+              </a:ext>
+            </a:extLst>
+          </p:cNvPr>
+          <p:cNvSpPr txBox="1"/>
+          <p:nvPr/>
+        </p:nvSpPr>
+        <p:spPr>
+          <a:xfrm>
+            <a:off x="9598850" y="2549238"/>
+            <a:ext cx="1248573" cy="646331"/>
+          </a:xfrm>
+          <a:prstGeom prst="rect">
+            <a:avLst/>
+          </a:prstGeom>
+          <a:noFill/>
+        </p:spPr>
+        <p:txBody>
+          <a:bodyPr wrap="square" rtlCol="0">
+            <a:spAutoFit/>
+          </a:bodyPr>
+          <a:lstStyle/>
+          <a:p>
+            <a:pPr algn="ctr"/>
+            <a:r>
+              <a:rPr lang="en-US" sz="1200" dirty="0"/>
+              <a:t>Convert diagram </a:t>
+            </a:r>
+            <a:r>
+              <a:rPr lang="en-US" sz="1200" dirty="0" err="1"/>
+              <a:t>json</a:t>
+            </a:r>
+            <a:r>
+              <a:rPr lang="en-US" sz="1200" dirty="0"/>
+              <a:t> to </a:t>
+            </a:r>
+            <a:r>
+              <a:rPr lang="en-US" sz="1200" dirty="0" err="1"/>
+              <a:t>cytosacpe.js</a:t>
+            </a:r>
+            <a:r>
+              <a:rPr lang="en-US" sz="1200" dirty="0"/>
+              <a:t> </a:t>
+            </a:r>
+            <a:r>
+              <a:rPr lang="en-US" sz="1200" dirty="0" err="1"/>
+              <a:t>json</a:t>
+            </a:r>
+            <a:endParaRPr lang="en-US" sz="1200" dirty="0"/>
+          </a:p>
+        </p:txBody>
+      </p:sp>
+      <p:sp>
+        <p:nvSpPr>
+          <p:cNvPr id="29" name="TextBox 28">
+            <a:extLst>
+              <a:ext uri="{FF2B5EF4-FFF2-40B4-BE49-F238E27FC236}">
+                <a16:creationId xmlns:a16="http://schemas.microsoft.com/office/drawing/2014/main" id="{D7165115-7274-E9BF-D3F8-59EB0CCB21ED}"/>
+              </a:ext>
+            </a:extLst>
+          </p:cNvPr>
+          <p:cNvSpPr txBox="1"/>
+          <p:nvPr/>
+        </p:nvSpPr>
+        <p:spPr>
+          <a:xfrm>
+            <a:off x="6481621" y="3056126"/>
+            <a:ext cx="3104644" cy="646331"/>
+          </a:xfrm>
+          <a:prstGeom prst="rect">
+            <a:avLst/>
+          </a:prstGeom>
+          <a:noFill/>
+        </p:spPr>
+        <p:txBody>
+          <a:bodyPr wrap="square" rtlCol="0">
+            <a:spAutoFit/>
+          </a:bodyPr>
+          <a:lstStyle/>
+          <a:p>
+            <a:pPr algn="ctr"/>
+            <a:r>
+              <a:rPr lang="en-US" sz="1200" dirty="0"/>
+              <a:t>Load </a:t>
+            </a:r>
+            <a:r>
+              <a:rPr lang="en-US" sz="1200" dirty="0" err="1"/>
+              <a:t>json</a:t>
+            </a:r>
+            <a:r>
+              <a:rPr lang="en-US" sz="1200" dirty="0"/>
+              <a:t> for pathway diagram when ”enable edit” is called if no user staged file (1</a:t>
+            </a:r>
+            <a:r>
+              <a:rPr lang="en-US" sz="1200" baseline="30000" dirty="0"/>
+              <a:t>st</a:t>
+            </a:r>
+            <a:r>
+              <a:rPr lang="en-US" sz="1200" dirty="0"/>
+              <a:t> choice) or </a:t>
+            </a:r>
+            <a:r>
+              <a:rPr lang="en-US" sz="1200" dirty="0" err="1"/>
+              <a:t>cytoscape.js</a:t>
+            </a:r>
+            <a:r>
+              <a:rPr lang="en-US" sz="1200" dirty="0"/>
+              <a:t> (2</a:t>
+            </a:r>
+            <a:r>
+              <a:rPr lang="en-US" sz="1200" baseline="30000" dirty="0"/>
+              <a:t>nd</a:t>
+            </a:r>
+            <a:r>
+              <a:rPr lang="en-US" sz="1200" dirty="0"/>
+              <a:t> choice) exists</a:t>
+            </a:r>
+          </a:p>
+        </p:txBody>
+      </p:sp>
+      <p:cxnSp>
+        <p:nvCxnSpPr>
+          <p:cNvPr id="30" name="Elbow Connector 29">
+            <a:extLst>
+              <a:ext uri="{FF2B5EF4-FFF2-40B4-BE49-F238E27FC236}">
+                <a16:creationId xmlns:a16="http://schemas.microsoft.com/office/drawing/2014/main" id="{B2DA8C83-B71C-5D1A-86D7-F725AD41E8D7}"/>
+              </a:ext>
+            </a:extLst>
+          </p:cNvPr>
+          <p:cNvCxnSpPr>
+            <a:cxnSpLocks/>
+            <a:stCxn id="8" idx="2"/>
+            <a:endCxn id="7" idx="2"/>
+          </p:cNvCxnSpPr>
+          <p:nvPr/>
+        </p:nvCxnSpPr>
+        <p:spPr>
+          <a:xfrm rot="5400000">
+            <a:off x="6447376" y="2047355"/>
+            <a:ext cx="1015968" cy="7809298"/>
+          </a:xfrm>
+          <a:prstGeom prst="bentConnector3">
+            <a:avLst>
+              <a:gd name="adj1" fmla="val 122501"/>
+            </a:avLst>
+          </a:prstGeom>
+          <a:ln w="12700">
+            <a:tailEnd type="triangle"/>
+          </a:ln>
+        </p:spPr>
+        <p:style>
+          <a:lnRef idx="1">
+            <a:schemeClr val="accent1"/>
+          </a:lnRef>
+          <a:fillRef idx="0">
+            <a:schemeClr val="accent1"/>
+          </a:fillRef>
+          <a:effectRef idx="0">
+            <a:schemeClr val="accent1"/>
+          </a:effectRef>
+          <a:fontRef idx="minor">
+            <a:schemeClr val="tx1"/>
+          </a:fontRef>
+        </p:style>
+      </p:cxnSp>
+      <p:sp>
+        <p:nvSpPr>
+          <p:cNvPr id="33" name="TextBox 32">
+            <a:extLst>
+              <a:ext uri="{FF2B5EF4-FFF2-40B4-BE49-F238E27FC236}">
+                <a16:creationId xmlns:a16="http://schemas.microsoft.com/office/drawing/2014/main" id="{5710E1A5-F39D-1B53-DC0C-5D95428564A6}"/>
+              </a:ext>
+            </a:extLst>
+          </p:cNvPr>
+          <p:cNvSpPr txBox="1"/>
+          <p:nvPr/>
+        </p:nvSpPr>
+        <p:spPr>
+          <a:xfrm>
+            <a:off x="7141697" y="6190783"/>
+            <a:ext cx="3705726" cy="461665"/>
+          </a:xfrm>
+          <a:prstGeom prst="rect">
+            <a:avLst/>
+          </a:prstGeom>
+          <a:noFill/>
+        </p:spPr>
+        <p:txBody>
+          <a:bodyPr wrap="square" rtlCol="0">
+            <a:spAutoFit/>
+          </a:bodyPr>
+          <a:lstStyle/>
+          <a:p>
+            <a:pPr algn="ctr"/>
+            <a:r>
+              <a:rPr lang="en-US" sz="1200" dirty="0"/>
+              <a:t>User edited diagram is persisted in </a:t>
+            </a:r>
+            <a:r>
+              <a:rPr lang="en-US" sz="1200" dirty="0" err="1"/>
+              <a:t>cytospape.js</a:t>
+            </a:r>
+            <a:r>
+              <a:rPr lang="en-US" sz="1200" dirty="0"/>
+              <a:t> </a:t>
+            </a:r>
+            <a:r>
+              <a:rPr lang="en-US" sz="1200" dirty="0" err="1"/>
+              <a:t>json</a:t>
+            </a:r>
+            <a:r>
+              <a:rPr lang="en-US" sz="1200" dirty="0"/>
+              <a:t> at user’s staged space (other users cannot see edits)</a:t>
+            </a:r>
+          </a:p>
+        </p:txBody>
+      </p:sp>
+      <p:cxnSp>
+        <p:nvCxnSpPr>
+          <p:cNvPr id="35" name="Elbow Connector 34">
+            <a:extLst>
+              <a:ext uri="{FF2B5EF4-FFF2-40B4-BE49-F238E27FC236}">
+                <a16:creationId xmlns:a16="http://schemas.microsoft.com/office/drawing/2014/main" id="{B0B05B72-FA49-220F-A08B-DBEC850E46B5}"/>
+              </a:ext>
+            </a:extLst>
+          </p:cNvPr>
+          <p:cNvCxnSpPr>
+            <a:cxnSpLocks/>
+            <a:stCxn id="8" idx="1"/>
+            <a:endCxn id="7" idx="3"/>
+          </p:cNvCxnSpPr>
+          <p:nvPr/>
+        </p:nvCxnSpPr>
+        <p:spPr>
+          <a:xfrm rot="10800000" flipV="1">
+            <a:off x="3945861" y="4620260"/>
+            <a:ext cx="5864995" cy="1608722"/>
+          </a:xfrm>
+          <a:prstGeom prst="bentConnector3">
+            <a:avLst>
+              <a:gd name="adj1" fmla="val 50000"/>
+            </a:avLst>
+          </a:prstGeom>
+          <a:ln w="12700">
+            <a:headEnd type="triangle"/>
+            <a:tailEnd type="none"/>
+          </a:ln>
+        </p:spPr>
+        <p:style>
+          <a:lnRef idx="1">
+            <a:schemeClr val="accent1"/>
+          </a:lnRef>
+          <a:fillRef idx="0">
+            <a:schemeClr val="accent1"/>
+          </a:fillRef>
+          <a:effectRef idx="0">
+            <a:schemeClr val="accent1"/>
+          </a:effectRef>
+          <a:fontRef idx="minor">
+            <a:schemeClr val="tx1"/>
+          </a:fontRef>
+        </p:style>
+      </p:cxnSp>
+      <p:sp>
+        <p:nvSpPr>
+          <p:cNvPr id="40" name="TextBox 39">
+            <a:extLst>
+              <a:ext uri="{FF2B5EF4-FFF2-40B4-BE49-F238E27FC236}">
+                <a16:creationId xmlns:a16="http://schemas.microsoft.com/office/drawing/2014/main" id="{F1DD6248-E3AE-73EC-7EDD-80A35267DB97}"/>
+              </a:ext>
+            </a:extLst>
+          </p:cNvPr>
+          <p:cNvSpPr txBox="1"/>
+          <p:nvPr/>
+        </p:nvSpPr>
+        <p:spPr>
+          <a:xfrm>
+            <a:off x="7604913" y="4359785"/>
+            <a:ext cx="1251587" cy="276999"/>
+          </a:xfrm>
+          <a:prstGeom prst="rect">
+            <a:avLst/>
+          </a:prstGeom>
+          <a:noFill/>
+        </p:spPr>
+        <p:txBody>
+          <a:bodyPr wrap="square" rtlCol="0">
+            <a:spAutoFit/>
+          </a:bodyPr>
+          <a:lstStyle/>
+          <a:p>
+            <a:pPr algn="ctr"/>
+            <a:r>
+              <a:rPr lang="en-US" sz="1200" dirty="0"/>
+              <a:t>Load for editing</a:t>
+            </a:r>
+          </a:p>
+        </p:txBody>
+      </p:sp>
+      <p:sp>
+        <p:nvSpPr>
+          <p:cNvPr id="44" name="Rectangle 43">
+            <a:extLst>
+              <a:ext uri="{FF2B5EF4-FFF2-40B4-BE49-F238E27FC236}">
+                <a16:creationId xmlns:a16="http://schemas.microsoft.com/office/drawing/2014/main" id="{00E2DB7A-04CC-4A92-E9AD-84B5F8A8DF6F}"/>
+              </a:ext>
+            </a:extLst>
+          </p:cNvPr>
+          <p:cNvSpPr/>
+          <p:nvPr/>
+        </p:nvSpPr>
+        <p:spPr>
+          <a:xfrm>
+            <a:off x="2155562" y="4389381"/>
+            <a:ext cx="1790298" cy="462012"/>
+          </a:xfrm>
+          <a:prstGeom prst="rect">
+            <a:avLst/>
+          </a:prstGeom>
+        </p:spPr>
+        <p:style>
+          <a:lnRef idx="2">
+            <a:schemeClr val="accent2">
+              <a:shade val="15000"/>
+            </a:schemeClr>
+          </a:lnRef>
+          <a:fillRef idx="1">
+            <a:schemeClr val="accent2"/>
+          </a:fillRef>
+          <a:effectRef idx="0">
+            <a:schemeClr val="accent2"/>
+          </a:effectRef>
+          <a:fontRef idx="minor">
+            <a:schemeClr val="lt1"/>
+          </a:fontRef>
+        </p:style>
+        <p:txBody>
+          <a:bodyPr rtlCol="0" anchor="ctr"/>
+          <a:lstStyle/>
+          <a:p>
+            <a:pPr algn="ctr"/>
+            <a:r>
+              <a:rPr lang="en-US" sz="1400" dirty="0" err="1"/>
+              <a:t>Cytoscape.js</a:t>
+            </a:r>
+            <a:r>
+              <a:rPr lang="en-US" sz="1400" dirty="0"/>
+              <a:t> </a:t>
+            </a:r>
+            <a:r>
+              <a:rPr lang="en-US" sz="1400" dirty="0" err="1"/>
+              <a:t>json</a:t>
+            </a:r>
+            <a:r>
+              <a:rPr lang="en-US" sz="1400" dirty="0"/>
+              <a:t> (</a:t>
+            </a:r>
+            <a:r>
+              <a:rPr lang="en-US" sz="1400" dirty="0" err="1"/>
+              <a:t>PathwayDiagram</a:t>
+            </a:r>
+            <a:r>
+              <a:rPr lang="en-US" sz="1400" dirty="0"/>
+              <a:t>)</a:t>
+            </a:r>
+          </a:p>
+        </p:txBody>
+      </p:sp>
+      <p:cxnSp>
+        <p:nvCxnSpPr>
+          <p:cNvPr id="67" name="Elbow Connector 66">
+            <a:extLst>
+              <a:ext uri="{FF2B5EF4-FFF2-40B4-BE49-F238E27FC236}">
+                <a16:creationId xmlns:a16="http://schemas.microsoft.com/office/drawing/2014/main" id="{792E8D05-E4F7-34A8-8399-5C54F79B39EC}"/>
+              </a:ext>
+            </a:extLst>
+          </p:cNvPr>
+          <p:cNvCxnSpPr>
+            <a:cxnSpLocks/>
+            <a:stCxn id="44" idx="3"/>
+            <a:endCxn id="8" idx="1"/>
+          </p:cNvCxnSpPr>
+          <p:nvPr/>
+        </p:nvCxnSpPr>
+        <p:spPr>
+          <a:xfrm flipV="1">
+            <a:off x="3945860" y="4620260"/>
+            <a:ext cx="5864995" cy="127"/>
+          </a:xfrm>
+          <a:prstGeom prst="bentConnector3">
+            <a:avLst>
+              <a:gd name="adj1" fmla="val 50000"/>
+            </a:avLst>
+          </a:prstGeom>
+          <a:ln w="12700">
+            <a:tailEnd type="triangle"/>
+          </a:ln>
+        </p:spPr>
+        <p:style>
+          <a:lnRef idx="1">
+            <a:schemeClr val="accent1"/>
+          </a:lnRef>
+          <a:fillRef idx="0">
+            <a:schemeClr val="accent1"/>
+          </a:fillRef>
+          <a:effectRef idx="0">
+            <a:schemeClr val="accent1"/>
+          </a:effectRef>
+          <a:fontRef idx="minor">
+            <a:schemeClr val="tx1"/>
+          </a:fontRef>
+        </p:style>
+      </p:cxnSp>
+      <p:cxnSp>
+        <p:nvCxnSpPr>
+          <p:cNvPr id="68" name="Elbow Connector 67">
+            <a:extLst>
+              <a:ext uri="{FF2B5EF4-FFF2-40B4-BE49-F238E27FC236}">
+                <a16:creationId xmlns:a16="http://schemas.microsoft.com/office/drawing/2014/main" id="{64AEB863-7CC0-0C49-5C71-6F7694EEDA58}"/>
+              </a:ext>
+            </a:extLst>
+          </p:cNvPr>
+          <p:cNvCxnSpPr>
+            <a:cxnSpLocks/>
+            <a:stCxn id="5" idx="3"/>
+            <a:endCxn id="8" idx="0"/>
+          </p:cNvCxnSpPr>
+          <p:nvPr/>
+        </p:nvCxnSpPr>
+        <p:spPr>
+          <a:xfrm>
+            <a:off x="5700025" y="3689547"/>
+            <a:ext cx="5159984" cy="106952"/>
+          </a:xfrm>
+          <a:prstGeom prst="bentConnector2">
+            <a:avLst/>
+          </a:prstGeom>
+          <a:ln w="12700">
+            <a:tailEnd type="triangle"/>
+          </a:ln>
+        </p:spPr>
+        <p:style>
+          <a:lnRef idx="1">
+            <a:schemeClr val="accent1"/>
+          </a:lnRef>
+          <a:fillRef idx="0">
+            <a:schemeClr val="accent1"/>
+          </a:fillRef>
+          <a:effectRef idx="0">
+            <a:schemeClr val="accent1"/>
+          </a:effectRef>
+          <a:fontRef idx="minor">
+            <a:schemeClr val="tx1"/>
+          </a:fontRef>
+        </p:style>
+      </p:cxnSp>
+      <p:sp>
+        <p:nvSpPr>
+          <p:cNvPr id="78" name="TextBox 77">
+            <a:extLst>
+              <a:ext uri="{FF2B5EF4-FFF2-40B4-BE49-F238E27FC236}">
+                <a16:creationId xmlns:a16="http://schemas.microsoft.com/office/drawing/2014/main" id="{8983B5CC-5A25-6213-21A7-C2BF434E6346}"/>
+              </a:ext>
+            </a:extLst>
+          </p:cNvPr>
+          <p:cNvSpPr txBox="1"/>
+          <p:nvPr/>
+        </p:nvSpPr>
+        <p:spPr>
+          <a:xfrm>
+            <a:off x="4189704" y="5946219"/>
+            <a:ext cx="1673790" cy="276999"/>
+          </a:xfrm>
+          <a:prstGeom prst="rect">
+            <a:avLst/>
+          </a:prstGeom>
+          <a:noFill/>
+        </p:spPr>
+        <p:txBody>
+          <a:bodyPr wrap="square" rtlCol="0">
+            <a:spAutoFit/>
+          </a:bodyPr>
+          <a:lstStyle/>
+          <a:p>
+            <a:pPr algn="ctr"/>
+            <a:r>
+              <a:rPr lang="en-US" sz="1200" dirty="0"/>
+              <a:t>First choice for editing</a:t>
+            </a:r>
+          </a:p>
+        </p:txBody>
+      </p:sp>
+      <p:sp>
+        <p:nvSpPr>
+          <p:cNvPr id="79" name="TextBox 78">
+            <a:extLst>
+              <a:ext uri="{FF2B5EF4-FFF2-40B4-BE49-F238E27FC236}">
+                <a16:creationId xmlns:a16="http://schemas.microsoft.com/office/drawing/2014/main" id="{AB9DA9C6-7B40-A1E0-9F49-E38E7321899A}"/>
+              </a:ext>
+            </a:extLst>
+          </p:cNvPr>
+          <p:cNvSpPr txBox="1"/>
+          <p:nvPr/>
+        </p:nvSpPr>
+        <p:spPr>
+          <a:xfrm>
+            <a:off x="3945860" y="4589573"/>
+            <a:ext cx="2098306" cy="276999"/>
+          </a:xfrm>
+          <a:prstGeom prst="rect">
+            <a:avLst/>
+          </a:prstGeom>
+          <a:noFill/>
+        </p:spPr>
+        <p:txBody>
+          <a:bodyPr wrap="square" rtlCol="0">
+            <a:spAutoFit/>
+          </a:bodyPr>
+          <a:lstStyle/>
+          <a:p>
+            <a:pPr algn="ctr"/>
+            <a:r>
+              <a:rPr lang="en-US" sz="1200" dirty="0"/>
+              <a:t>Second choice for editing</a:t>
+            </a:r>
+          </a:p>
+        </p:txBody>
+      </p:sp>
+      <p:cxnSp>
+        <p:nvCxnSpPr>
+          <p:cNvPr id="82" name="Elbow Connector 81">
+            <a:extLst>
+              <a:ext uri="{FF2B5EF4-FFF2-40B4-BE49-F238E27FC236}">
+                <a16:creationId xmlns:a16="http://schemas.microsoft.com/office/drawing/2014/main" id="{C75921DB-0DFA-42C9-53FD-74C3DED2221B}"/>
+              </a:ext>
+            </a:extLst>
+          </p:cNvPr>
+          <p:cNvCxnSpPr>
+            <a:cxnSpLocks/>
+            <a:stCxn id="8" idx="2"/>
+            <a:endCxn id="44" idx="2"/>
+          </p:cNvCxnSpPr>
+          <p:nvPr/>
+        </p:nvCxnSpPr>
+        <p:spPr>
+          <a:xfrm rot="5400000" flipH="1">
+            <a:off x="6659046" y="1243058"/>
+            <a:ext cx="592627" cy="7809298"/>
+          </a:xfrm>
+          <a:prstGeom prst="bentConnector3">
+            <a:avLst>
+              <a:gd name="adj1" fmla="val -38574"/>
+            </a:avLst>
+          </a:prstGeom>
+          <a:ln w="9525">
+            <a:solidFill>
+              <a:srgbClr val="C00000"/>
+            </a:solidFill>
+            <a:tailEnd type="triangle"/>
+          </a:ln>
+        </p:spPr>
+        <p:style>
+          <a:lnRef idx="1">
+            <a:schemeClr val="accent1"/>
+          </a:lnRef>
+          <a:fillRef idx="0">
+            <a:schemeClr val="accent1"/>
+          </a:fillRef>
+          <a:effectRef idx="0">
+            <a:schemeClr val="accent1"/>
+          </a:effectRef>
+          <a:fontRef idx="minor">
+            <a:schemeClr val="tx1"/>
+          </a:fontRef>
+        </p:style>
+      </p:cxnSp>
+      <p:cxnSp>
+        <p:nvCxnSpPr>
+          <p:cNvPr id="84" name="Elbow Connector 83">
+            <a:extLst>
+              <a:ext uri="{FF2B5EF4-FFF2-40B4-BE49-F238E27FC236}">
+                <a16:creationId xmlns:a16="http://schemas.microsoft.com/office/drawing/2014/main" id="{101BE050-1A82-45E7-8432-C080D7EC58EF}"/>
+              </a:ext>
+            </a:extLst>
+          </p:cNvPr>
+          <p:cNvCxnSpPr>
+            <a:cxnSpLocks/>
+            <a:stCxn id="44" idx="0"/>
+            <a:endCxn id="6" idx="2"/>
+          </p:cNvCxnSpPr>
+          <p:nvPr/>
+        </p:nvCxnSpPr>
+        <p:spPr>
+          <a:xfrm rot="5400000" flipH="1" flipV="1">
+            <a:off x="2756007" y="2633243"/>
+            <a:ext cx="2050843" cy="1461435"/>
+          </a:xfrm>
+          <a:prstGeom prst="bentConnector3">
+            <a:avLst>
+              <a:gd name="adj1" fmla="val 50000"/>
+            </a:avLst>
+          </a:prstGeom>
+          <a:ln w="9525">
+            <a:solidFill>
+              <a:srgbClr val="C00000"/>
+            </a:solidFill>
+            <a:tailEnd type="triangle"/>
+          </a:ln>
+        </p:spPr>
+        <p:style>
+          <a:lnRef idx="1">
+            <a:schemeClr val="accent1"/>
+          </a:lnRef>
+          <a:fillRef idx="0">
+            <a:schemeClr val="accent1"/>
+          </a:fillRef>
+          <a:effectRef idx="0">
+            <a:schemeClr val="accent1"/>
+          </a:effectRef>
+          <a:fontRef idx="minor">
+            <a:schemeClr val="tx1"/>
+          </a:fontRef>
+        </p:style>
+      </p:cxnSp>
+      <p:cxnSp>
+        <p:nvCxnSpPr>
+          <p:cNvPr id="87" name="Elbow Connector 86">
+            <a:extLst>
+              <a:ext uri="{FF2B5EF4-FFF2-40B4-BE49-F238E27FC236}">
+                <a16:creationId xmlns:a16="http://schemas.microsoft.com/office/drawing/2014/main" id="{DEE6C8BD-B5E9-B36F-89C0-B1AEC50BA5E1}"/>
+              </a:ext>
+            </a:extLst>
+          </p:cNvPr>
+          <p:cNvCxnSpPr>
+            <a:cxnSpLocks/>
+            <a:stCxn id="44" idx="0"/>
+            <a:endCxn id="4" idx="2"/>
+          </p:cNvCxnSpPr>
+          <p:nvPr/>
+        </p:nvCxnSpPr>
+        <p:spPr>
+          <a:xfrm rot="16200000" flipV="1">
+            <a:off x="1297780" y="2636450"/>
+            <a:ext cx="2050842" cy="1455020"/>
+          </a:xfrm>
+          <a:prstGeom prst="bentConnector3">
+            <a:avLst>
+              <a:gd name="adj1" fmla="val 50000"/>
+            </a:avLst>
+          </a:prstGeom>
+          <a:ln w="9525">
+            <a:solidFill>
+              <a:srgbClr val="C00000"/>
+            </a:solidFill>
+            <a:tailEnd type="triangle"/>
+          </a:ln>
+        </p:spPr>
+        <p:style>
+          <a:lnRef idx="1">
+            <a:schemeClr val="accent1"/>
+          </a:lnRef>
+          <a:fillRef idx="0">
+            <a:schemeClr val="accent1"/>
+          </a:fillRef>
+          <a:effectRef idx="0">
+            <a:schemeClr val="accent1"/>
+          </a:effectRef>
+          <a:fontRef idx="minor">
+            <a:schemeClr val="tx1"/>
+          </a:fontRef>
+        </p:style>
+      </p:cxnSp>
+      <p:cxnSp>
+        <p:nvCxnSpPr>
+          <p:cNvPr id="90" name="Elbow Connector 89">
+            <a:extLst>
+              <a:ext uri="{FF2B5EF4-FFF2-40B4-BE49-F238E27FC236}">
+                <a16:creationId xmlns:a16="http://schemas.microsoft.com/office/drawing/2014/main" id="{228712EB-6F74-75DE-A4F5-D1FFAE77CFAF}"/>
+              </a:ext>
+            </a:extLst>
+          </p:cNvPr>
+          <p:cNvCxnSpPr>
+            <a:cxnSpLocks/>
+            <a:stCxn id="8" idx="2"/>
+            <a:endCxn id="11" idx="2"/>
+          </p:cNvCxnSpPr>
+          <p:nvPr/>
+        </p:nvCxnSpPr>
+        <p:spPr>
+          <a:xfrm rot="5400000" flipH="1">
+            <a:off x="5756853" y="340865"/>
+            <a:ext cx="1327765" cy="8878546"/>
+          </a:xfrm>
+          <a:prstGeom prst="bentConnector3">
+            <a:avLst>
+              <a:gd name="adj1" fmla="val -17217"/>
+            </a:avLst>
+          </a:prstGeom>
+          <a:ln w="9525">
+            <a:solidFill>
+              <a:srgbClr val="C00000"/>
+            </a:solidFill>
+            <a:tailEnd type="triangle"/>
+          </a:ln>
+        </p:spPr>
+        <p:style>
+          <a:lnRef idx="1">
+            <a:schemeClr val="accent1"/>
+          </a:lnRef>
+          <a:fillRef idx="0">
+            <a:schemeClr val="accent1"/>
+          </a:fillRef>
+          <a:effectRef idx="0">
+            <a:schemeClr val="accent1"/>
+          </a:effectRef>
+          <a:fontRef idx="minor">
+            <a:schemeClr val="tx1"/>
+          </a:fontRef>
+        </p:style>
+      </p:cxnSp>
+      <p:cxnSp>
+        <p:nvCxnSpPr>
+          <p:cNvPr id="93" name="Elbow Connector 92">
+            <a:extLst>
+              <a:ext uri="{FF2B5EF4-FFF2-40B4-BE49-F238E27FC236}">
+                <a16:creationId xmlns:a16="http://schemas.microsoft.com/office/drawing/2014/main" id="{CE7FADC4-6A3E-14D6-3278-D66E124D0D76}"/>
+              </a:ext>
+            </a:extLst>
+          </p:cNvPr>
+          <p:cNvCxnSpPr>
+            <a:cxnSpLocks/>
+            <a:stCxn id="8" idx="2"/>
+            <a:endCxn id="7" idx="0"/>
+          </p:cNvCxnSpPr>
+          <p:nvPr/>
+        </p:nvCxnSpPr>
+        <p:spPr>
+          <a:xfrm rot="5400000">
+            <a:off x="6678382" y="1816349"/>
+            <a:ext cx="553956" cy="7809298"/>
+          </a:xfrm>
+          <a:prstGeom prst="bentConnector3">
+            <a:avLst>
+              <a:gd name="adj1" fmla="val 41312"/>
+            </a:avLst>
+          </a:prstGeom>
+          <a:ln w="9525">
+            <a:solidFill>
+              <a:srgbClr val="C00000"/>
+            </a:solidFill>
+            <a:tailEnd type="triangle"/>
+          </a:ln>
+        </p:spPr>
+        <p:style>
+          <a:lnRef idx="1">
+            <a:schemeClr val="accent1"/>
+          </a:lnRef>
+          <a:fillRef idx="0">
+            <a:schemeClr val="accent1"/>
+          </a:fillRef>
+          <a:effectRef idx="0">
+            <a:schemeClr val="accent1"/>
+          </a:effectRef>
+          <a:fontRef idx="minor">
+            <a:schemeClr val="tx1"/>
+          </a:fontRef>
+        </p:style>
+      </p:cxnSp>
+      <p:sp>
+        <p:nvSpPr>
+          <p:cNvPr id="97" name="TextBox 96">
+            <a:extLst>
+              <a:ext uri="{FF2B5EF4-FFF2-40B4-BE49-F238E27FC236}">
+                <a16:creationId xmlns:a16="http://schemas.microsoft.com/office/drawing/2014/main" id="{D1414A40-FB10-5CE8-F48B-3487C7C1C2C6}"/>
+              </a:ext>
+            </a:extLst>
+          </p:cNvPr>
+          <p:cNvSpPr txBox="1"/>
+          <p:nvPr/>
+        </p:nvSpPr>
+        <p:spPr>
+          <a:xfrm>
+            <a:off x="500016" y="6785357"/>
+            <a:ext cx="10359992" cy="1015663"/>
+          </a:xfrm>
+          <a:prstGeom prst="rect">
+            <a:avLst/>
+          </a:prstGeom>
+          <a:noFill/>
+        </p:spPr>
+        <p:txBody>
+          <a:bodyPr wrap="square" rtlCol="0">
+            <a:spAutoFit/>
+          </a:bodyPr>
+          <a:lstStyle/>
+          <a:p>
+            <a:r>
+              <a:rPr lang="en-US" sz="1200" dirty="0"/>
+              <a:t>When upload diagram is called (red arrows), the following occurs:</a:t>
+            </a:r>
+          </a:p>
+          <a:p>
+            <a:pPr marL="228600" indent="-228600">
+              <a:buFont typeface="+mj-lt"/>
+              <a:buAutoNum type="arabicPeriod"/>
+            </a:pPr>
+            <a:r>
+              <a:rPr lang="en-US" sz="1200" dirty="0"/>
+              <a:t>Upload </a:t>
+            </a:r>
+            <a:r>
+              <a:rPr lang="en-US" sz="1200" dirty="0" err="1"/>
+              <a:t>cytoscape.js</a:t>
+            </a:r>
+            <a:r>
+              <a:rPr lang="en-US" sz="1200" dirty="0"/>
+              <a:t> </a:t>
+            </a:r>
+            <a:r>
+              <a:rPr lang="en-US" sz="1200" dirty="0" err="1"/>
+              <a:t>json</a:t>
+            </a:r>
+            <a:r>
+              <a:rPr lang="en-US" sz="1200" dirty="0"/>
+              <a:t> to the central space (saved in a shared file), enabling other users to edit the same pathway diagram</a:t>
+            </a:r>
+          </a:p>
+          <a:p>
+            <a:pPr marL="228600" indent="-228600">
+              <a:buFont typeface="+mj-lt"/>
+              <a:buAutoNum type="arabicPeriod"/>
+            </a:pPr>
+            <a:r>
+              <a:rPr lang="en-US" sz="1200" dirty="0"/>
+              <a:t>Create or update </a:t>
+            </a:r>
+            <a:r>
+              <a:rPr lang="en-US" sz="1200" dirty="0" err="1"/>
+              <a:t>PathwayDiagram</a:t>
+            </a:r>
+            <a:r>
+              <a:rPr lang="en-US" sz="1200" dirty="0"/>
+              <a:t> instance associated with this </a:t>
+            </a:r>
+            <a:r>
+              <a:rPr lang="en-US" sz="1200" dirty="0" err="1"/>
+              <a:t>cytoscape.js</a:t>
+            </a:r>
+            <a:r>
+              <a:rPr lang="en-US" sz="1200" dirty="0"/>
+              <a:t> </a:t>
+            </a:r>
+          </a:p>
+          <a:p>
+            <a:pPr marL="228600" indent="-228600">
+              <a:buFont typeface="+mj-lt"/>
+              <a:buAutoNum type="arabicPeriod"/>
+            </a:pPr>
+            <a:r>
+              <a:rPr lang="en-US" sz="1200" dirty="0"/>
+              <a:t>Generate diagram </a:t>
+            </a:r>
+            <a:r>
+              <a:rPr lang="en-US" sz="1200" dirty="0" err="1"/>
+              <a:t>json</a:t>
+            </a:r>
+            <a:r>
+              <a:rPr lang="en-US" sz="1200" dirty="0"/>
+              <a:t> files for the represented pathways, including both normal and disease pathways if applicable</a:t>
+            </a:r>
+          </a:p>
+          <a:p>
+            <a:pPr marL="228600" indent="-228600">
+              <a:buFont typeface="+mj-lt"/>
+              <a:buAutoNum type="arabicPeriod"/>
+            </a:pPr>
+            <a:r>
+              <a:rPr lang="en-US" sz="1200" dirty="0"/>
+              <a:t>Delete the </a:t>
+            </a:r>
+            <a:r>
+              <a:rPr lang="en-US" sz="1200" dirty="0" err="1"/>
+              <a:t>cytoscape.js</a:t>
+            </a:r>
+            <a:r>
+              <a:rPr lang="en-US" sz="1200" dirty="0"/>
+              <a:t> </a:t>
+            </a:r>
+            <a:r>
+              <a:rPr lang="en-US" sz="1200" dirty="0" err="1"/>
+              <a:t>json</a:t>
+            </a:r>
+            <a:r>
+              <a:rPr lang="en-US" sz="1200" dirty="0"/>
+              <a:t> at the user staged space.</a:t>
+            </a:r>
+          </a:p>
+        </p:txBody>
+      </p:sp>
+      <p:sp>
+        <p:nvSpPr>
+          <p:cNvPr id="115" name="TextBox 114">
+            <a:extLst>
+              <a:ext uri="{FF2B5EF4-FFF2-40B4-BE49-F238E27FC236}">
+                <a16:creationId xmlns:a16="http://schemas.microsoft.com/office/drawing/2014/main" id="{62EC0A3A-D36C-B614-5E3E-780141474D30}"/>
+              </a:ext>
+            </a:extLst>
+          </p:cNvPr>
+          <p:cNvSpPr txBox="1"/>
+          <p:nvPr/>
+        </p:nvSpPr>
+        <p:spPr>
+          <a:xfrm>
+            <a:off x="3037287" y="5715681"/>
+            <a:ext cx="579710" cy="276999"/>
+          </a:xfrm>
+          <a:prstGeom prst="rect">
+            <a:avLst/>
+          </a:prstGeom>
+          <a:noFill/>
+        </p:spPr>
+        <p:txBody>
+          <a:bodyPr wrap="none" rtlCol="0">
+            <a:spAutoFit/>
+          </a:bodyPr>
+          <a:lstStyle/>
+          <a:p>
+            <a:r>
+              <a:rPr lang="en-US" sz="1200" dirty="0"/>
+              <a:t>delete</a:t>
+            </a:r>
+          </a:p>
+        </p:txBody>
+      </p:sp>
+      <p:sp>
+        <p:nvSpPr>
+          <p:cNvPr id="116" name="TextBox 115">
+            <a:extLst>
+              <a:ext uri="{FF2B5EF4-FFF2-40B4-BE49-F238E27FC236}">
+                <a16:creationId xmlns:a16="http://schemas.microsoft.com/office/drawing/2014/main" id="{A218DF8B-365B-C983-C6FE-4DC0DAA8C778}"/>
+              </a:ext>
+            </a:extLst>
+          </p:cNvPr>
+          <p:cNvSpPr txBox="1"/>
+          <p:nvPr/>
+        </p:nvSpPr>
+        <p:spPr>
+          <a:xfrm>
+            <a:off x="3013297" y="5186194"/>
+            <a:ext cx="615874" cy="276999"/>
+          </a:xfrm>
+          <a:prstGeom prst="rect">
+            <a:avLst/>
+          </a:prstGeom>
+          <a:noFill/>
+        </p:spPr>
+        <p:txBody>
+          <a:bodyPr wrap="none" rtlCol="0">
+            <a:spAutoFit/>
+          </a:bodyPr>
+          <a:lstStyle/>
+          <a:p>
+            <a:r>
+              <a:rPr lang="en-US" sz="1200" dirty="0"/>
+              <a:t>upload</a:t>
+            </a:r>
+          </a:p>
+        </p:txBody>
+      </p:sp>
+      <p:sp>
+        <p:nvSpPr>
+          <p:cNvPr id="117" name="TextBox 116">
+            <a:extLst>
+              <a:ext uri="{FF2B5EF4-FFF2-40B4-BE49-F238E27FC236}">
+                <a16:creationId xmlns:a16="http://schemas.microsoft.com/office/drawing/2014/main" id="{E7EEE61A-5C4F-C111-80B9-2083D0733253}"/>
+              </a:ext>
+            </a:extLst>
+          </p:cNvPr>
+          <p:cNvSpPr txBox="1"/>
+          <p:nvPr/>
+        </p:nvSpPr>
+        <p:spPr>
+          <a:xfrm>
+            <a:off x="1916875" y="5071536"/>
+            <a:ext cx="750670" cy="461665"/>
+          </a:xfrm>
+          <a:prstGeom prst="rect">
+            <a:avLst/>
+          </a:prstGeom>
+          <a:noFill/>
+        </p:spPr>
+        <p:txBody>
+          <a:bodyPr wrap="square" rtlCol="0">
+            <a:spAutoFit/>
+          </a:bodyPr>
+          <a:lstStyle/>
+          <a:p>
+            <a:pPr algn="ctr"/>
+            <a:r>
+              <a:rPr lang="en-US" sz="1200" dirty="0"/>
+              <a:t>create or modify</a:t>
+            </a:r>
+          </a:p>
+        </p:txBody>
+      </p:sp>
+      <p:sp>
+        <p:nvSpPr>
+          <p:cNvPr id="118" name="TextBox 117">
+            <a:extLst>
+              <a:ext uri="{FF2B5EF4-FFF2-40B4-BE49-F238E27FC236}">
+                <a16:creationId xmlns:a16="http://schemas.microsoft.com/office/drawing/2014/main" id="{D6025849-C119-76D6-48E6-FF9D2173270C}"/>
+              </a:ext>
+            </a:extLst>
+          </p:cNvPr>
+          <p:cNvSpPr txBox="1"/>
+          <p:nvPr/>
+        </p:nvSpPr>
+        <p:spPr>
+          <a:xfrm>
+            <a:off x="3003067" y="3718421"/>
+            <a:ext cx="750670" cy="276999"/>
+          </a:xfrm>
+          <a:prstGeom prst="rect">
+            <a:avLst/>
+          </a:prstGeom>
+          <a:noFill/>
+        </p:spPr>
+        <p:txBody>
+          <a:bodyPr wrap="square" rtlCol="0">
+            <a:spAutoFit/>
+          </a:bodyPr>
+          <a:lstStyle/>
+          <a:p>
+            <a:pPr algn="ctr"/>
+            <a:r>
+              <a:rPr lang="en-US" sz="1200" dirty="0"/>
+              <a:t>generate</a:t>
+            </a:r>
+          </a:p>
+        </p:txBody>
+      </p:sp>
+    </p:spTree>
+    <p:extLst>
+      <p:ext uri="{BB962C8B-B14F-4D97-AF65-F5344CB8AC3E}">
+        <p14:creationId xmlns:p14="http://schemas.microsoft.com/office/powerpoint/2010/main" val="4189275845"/>
+      </p:ext>
+    </p:extLst>
+  </p:cSld>
+  <p:clrMapOvr>
+    <a:masterClrMapping/>
+  </p:clrMapOvr>
+</p:sld>
+</file>
+
 <file path=ppt/theme/theme1.xml><?xml version="1.0" encoding="utf-8"?>
 <a:theme xmlns:a="http://schemas.openxmlformats.org/drawingml/2006/main" name="Office Theme">
   <a:themeElements>
@@ -3877,4 +6103,319 @@
     </a:ext>
   </a:extLst>
 </a:theme>
+</file>
+
+<file path=ppt/theme/theme2.xml><?xml version="1.0" encoding="utf-8"?>
+<a:theme xmlns:a="http://schemas.openxmlformats.org/drawingml/2006/main" name="Office Theme">
+  <a:themeElements>
+    <a:clrScheme name="Office">
+      <a:dk1>
+        <a:sysClr val="windowText" lastClr="000000"/>
+      </a:dk1>
+      <a:lt1>
+        <a:sysClr val="window" lastClr="FFFFFF"/>
+      </a:lt1>
+      <a:dk2>
+        <a:srgbClr val="0E2841"/>
+      </a:dk2>
+      <a:lt2>
+        <a:srgbClr val="E8E8E8"/>
+      </a:lt2>
+      <a:accent1>
+        <a:srgbClr val="156082"/>
+      </a:accent1>
+      <a:accent2>
+        <a:srgbClr val="E97132"/>
+      </a:accent2>
+      <a:accent3>
+        <a:srgbClr val="196B24"/>
+      </a:accent3>
+      <a:accent4>
+        <a:srgbClr val="0F9ED5"/>
+      </a:accent4>
+      <a:accent5>
+        <a:srgbClr val="A02B93"/>
+      </a:accent5>
+      <a:accent6>
+        <a:srgbClr val="4EA72E"/>
+      </a:accent6>
+      <a:hlink>
+        <a:srgbClr val="467886"/>
+      </a:hlink>
+      <a:folHlink>
+        <a:srgbClr val="96607D"/>
+      </a:folHlink>
+    </a:clrScheme>
+    <a:fontScheme name="Office">
+      <a:majorFont>
+        <a:latin typeface="Aptos Display" panose="02110004020202020204"/>
+        <a:ea typeface=""/>
+        <a:cs typeface=""/>
+        <a:font script="Jpan" typeface="游ゴシック Light"/>
+        <a:font script="Hang" typeface="맑은 고딕"/>
+        <a:font script="Hans" typeface="等线 Light"/>
+        <a:font script="Hant" typeface="新細明體"/>
+        <a:font script="Arab" typeface="Times New Roman"/>
+        <a:font script="Hebr" typeface="Times New Roman"/>
+        <a:font script="Thai" typeface="Angsana New"/>
+        <a:font script="Ethi" typeface="Nyala"/>
+        <a:font script="Beng" typeface="Vrinda"/>
+        <a:font script="Gujr" typeface="Shruti"/>
+        <a:font script="Khmr" typeface="MoolBoran"/>
+        <a:font script="Knda" typeface="Tunga"/>
+        <a:font script="Guru" typeface="Raavi"/>
+        <a:font script="Cans" typeface="Euphemia"/>
+        <a:font script="Cher" typeface="Plantagenet Cherokee"/>
+        <a:font script="Yiii" typeface="Microsoft Yi Baiti"/>
+        <a:font script="Tibt" typeface="Microsoft Himalaya"/>
+        <a:font script="Thaa" typeface="MV Boli"/>
+        <a:font script="Deva" typeface="Mangal"/>
+        <a:font script="Telu" typeface="Gautami"/>
+        <a:font script="Taml" typeface="Latha"/>
+        <a:font script="Syrc" typeface="Estrangelo Edessa"/>
+        <a:font script="Orya" typeface="Kalinga"/>
+        <a:font script="Mlym" typeface="Kartika"/>
+        <a:font script="Laoo" typeface="DokChampa"/>
+        <a:font script="Sinh" typeface="Iskoola Pota"/>
+        <a:font script="Mong" typeface="Mongolian Baiti"/>
+        <a:font script="Viet" typeface="Times New Roman"/>
+        <a:font script="Uigh" typeface="Microsoft Uighur"/>
+        <a:font script="Geor" typeface="Sylfaen"/>
+        <a:font script="Armn" typeface="Arial"/>
+        <a:font script="Bugi" typeface="Leelawadee UI"/>
+        <a:font script="Bopo" typeface="Microsoft JhengHei"/>
+        <a:font script="Java" typeface="Javanese Text"/>
+        <a:font script="Lisu" typeface="Segoe UI"/>
+        <a:font script="Mymr" typeface="Myanmar Text"/>
+        <a:font script="Nkoo" typeface="Ebrima"/>
+        <a:font script="Olck" typeface="Nirmala UI"/>
+        <a:font script="Osma" typeface="Ebrima"/>
+        <a:font script="Phag" typeface="Phagspa"/>
+        <a:font script="Syrn" typeface="Estrangelo Edessa"/>
+        <a:font script="Syrj" typeface="Estrangelo Edessa"/>
+        <a:font script="Syre" typeface="Estrangelo Edessa"/>
+        <a:font script="Sora" typeface="Nirmala UI"/>
+        <a:font script="Tale" typeface="Microsoft Tai Le"/>
+        <a:font script="Talu" typeface="Microsoft New Tai Lue"/>
+        <a:font script="Tfng" typeface="Ebrima"/>
+      </a:majorFont>
+      <a:minorFont>
+        <a:latin typeface="Aptos" panose="02110004020202020204"/>
+        <a:ea typeface=""/>
+        <a:cs typeface=""/>
+        <a:font script="Jpan" typeface="游ゴシック"/>
+        <a:font script="Hang" typeface="맑은 고딕"/>
+        <a:font script="Hans" typeface="等线"/>
+        <a:font script="Hant" typeface="新細明體"/>
+        <a:font script="Arab" typeface="Arial"/>
+        <a:font script="Hebr" typeface="Arial"/>
+        <a:font script="Thai" typeface="Cordia New"/>
+        <a:font script="Ethi" typeface="Nyala"/>
+        <a:font script="Beng" typeface="Vrinda"/>
+        <a:font script="Gujr" typeface="Shruti"/>
+        <a:font script="Khmr" typeface="DaunPenh"/>
+        <a:font script="Knda" typeface="Tunga"/>
+        <a:font script="Guru" typeface="Raavi"/>
+        <a:font script="Cans" typeface="Euphemia"/>
+        <a:font script="Cher" typeface="Plantagenet Cherokee"/>
+        <a:font script="Yiii" typeface="Microsoft Yi Baiti"/>
+        <a:font script="Tibt" typeface="Microsoft Himalaya"/>
+        <a:font script="Thaa" typeface="MV Boli"/>
+        <a:font script="Deva" typeface="Mangal"/>
+        <a:font script="Telu" typeface="Gautami"/>
+        <a:font script="Taml" typeface="Latha"/>
+        <a:font script="Syrc" typeface="Estrangelo Edessa"/>
+        <a:font script="Orya" typeface="Kalinga"/>
+        <a:font script="Mlym" typeface="Kartika"/>
+        <a:font script="Laoo" typeface="DokChampa"/>
+        <a:font script="Sinh" typeface="Iskoola Pota"/>
+        <a:font script="Mong" typeface="Mongolian Baiti"/>
+        <a:font script="Viet" typeface="Arial"/>
+        <a:font script="Uigh" typeface="Microsoft Uighur"/>
+        <a:font script="Geor" typeface="Sylfaen"/>
+        <a:font script="Armn" typeface="Arial"/>
+        <a:font script="Bugi" typeface="Leelawadee UI"/>
+        <a:font script="Bopo" typeface="Microsoft JhengHei"/>
+        <a:font script="Java" typeface="Javanese Text"/>
+        <a:font script="Lisu" typeface="Segoe UI"/>
+        <a:font script="Mymr" typeface="Myanmar Text"/>
+        <a:font script="Nkoo" typeface="Ebrima"/>
+        <a:font script="Olck" typeface="Nirmala UI"/>
+        <a:font script="Osma" typeface="Ebrima"/>
+        <a:font script="Phag" typeface="Phagspa"/>
+        <a:font script="Syrn" typeface="Estrangelo Edessa"/>
+        <a:font script="Syrj" typeface="Estrangelo Edessa"/>
+        <a:font script="Syre" typeface="Estrangelo Edessa"/>
+        <a:font script="Sora" typeface="Nirmala UI"/>
+        <a:font script="Tale" typeface="Microsoft Tai Le"/>
+        <a:font script="Talu" typeface="Microsoft New Tai Lue"/>
+        <a:font script="Tfng" typeface="Ebrima"/>
+      </a:minorFont>
+    </a:fontScheme>
+    <a:fmtScheme name="Office">
+      <a:fillStyleLst>
+        <a:solidFill>
+          <a:schemeClr val="phClr"/>
+        </a:solidFill>
+        <a:gradFill rotWithShape="1">
+          <a:gsLst>
+            <a:gs pos="0">
+              <a:schemeClr val="phClr">
+                <a:lumMod val="110000"/>
+                <a:satMod val="105000"/>
+                <a:tint val="67000"/>
+              </a:schemeClr>
+            </a:gs>
+            <a:gs pos="50000">
+              <a:schemeClr val="phClr">
+                <a:lumMod val="105000"/>
+                <a:satMod val="103000"/>
+                <a:tint val="73000"/>
+              </a:schemeClr>
+            </a:gs>
+            <a:gs pos="100000">
+              <a:schemeClr val="phClr">
+                <a:lumMod val="105000"/>
+                <a:satMod val="109000"/>
+                <a:tint val="81000"/>
+              </a:schemeClr>
+            </a:gs>
+          </a:gsLst>
+          <a:lin ang="5400000" scaled="0"/>
+        </a:gradFill>
+        <a:gradFill rotWithShape="1">
+          <a:gsLst>
+            <a:gs pos="0">
+              <a:schemeClr val="phClr">
+                <a:satMod val="103000"/>
+                <a:lumMod val="102000"/>
+                <a:tint val="94000"/>
+              </a:schemeClr>
+            </a:gs>
+            <a:gs pos="50000">
+              <a:schemeClr val="phClr">
+                <a:satMod val="110000"/>
+                <a:lumMod val="100000"/>
+                <a:shade val="100000"/>
+              </a:schemeClr>
+            </a:gs>
+            <a:gs pos="100000">
+              <a:schemeClr val="phClr">
+                <a:lumMod val="99000"/>
+                <a:satMod val="120000"/>
+                <a:shade val="78000"/>
+              </a:schemeClr>
+            </a:gs>
+          </a:gsLst>
+          <a:lin ang="5400000" scaled="0"/>
+        </a:gradFill>
+      </a:fillStyleLst>
+      <a:lnStyleLst>
+        <a:ln w="12700" cap="flat" cmpd="sng" algn="ctr">
+          <a:solidFill>
+            <a:schemeClr val="phClr"/>
+          </a:solidFill>
+          <a:prstDash val="solid"/>
+          <a:miter lim="800000"/>
+        </a:ln>
+        <a:ln w="19050" cap="flat" cmpd="sng" algn="ctr">
+          <a:solidFill>
+            <a:schemeClr val="phClr"/>
+          </a:solidFill>
+          <a:prstDash val="solid"/>
+          <a:miter lim="800000"/>
+        </a:ln>
+        <a:ln w="25400" cap="flat" cmpd="sng" algn="ctr">
+          <a:solidFill>
+            <a:schemeClr val="phClr"/>
+          </a:solidFill>
+          <a:prstDash val="solid"/>
+          <a:miter lim="800000"/>
+        </a:ln>
+      </a:lnStyleLst>
+      <a:effectStyleLst>
+        <a:effectStyle>
+          <a:effectLst/>
+        </a:effectStyle>
+        <a:effectStyle>
+          <a:effectLst/>
+        </a:effectStyle>
+        <a:effectStyle>
+          <a:effectLst>
+            <a:outerShdw blurRad="57150" dist="19050" dir="5400000" algn="ctr" rotWithShape="0">
+              <a:srgbClr val="000000">
+                <a:alpha val="63000"/>
+              </a:srgbClr>
+            </a:outerShdw>
+          </a:effectLst>
+        </a:effectStyle>
+      </a:effectStyleLst>
+      <a:bgFillStyleLst>
+        <a:solidFill>
+          <a:schemeClr val="phClr"/>
+        </a:solidFill>
+        <a:solidFill>
+          <a:schemeClr val="phClr">
+            <a:tint val="95000"/>
+            <a:satMod val="170000"/>
+          </a:schemeClr>
+        </a:solidFill>
+        <a:gradFill rotWithShape="1">
+          <a:gsLst>
+            <a:gs pos="0">
+              <a:schemeClr val="phClr">
+                <a:tint val="93000"/>
+                <a:satMod val="150000"/>
+                <a:shade val="98000"/>
+                <a:lumMod val="102000"/>
+              </a:schemeClr>
+            </a:gs>
+            <a:gs pos="50000">
+              <a:schemeClr val="phClr">
+                <a:tint val="98000"/>
+                <a:satMod val="130000"/>
+                <a:shade val="90000"/>
+                <a:lumMod val="103000"/>
+              </a:schemeClr>
+            </a:gs>
+            <a:gs pos="100000">
+              <a:schemeClr val="phClr">
+                <a:shade val="63000"/>
+                <a:satMod val="120000"/>
+              </a:schemeClr>
+            </a:gs>
+          </a:gsLst>
+          <a:lin ang="5400000" scaled="0"/>
+        </a:gradFill>
+      </a:bgFillStyleLst>
+    </a:fmtScheme>
+  </a:themeElements>
+  <a:objectDefaults>
+    <a:lnDef>
+      <a:spPr/>
+      <a:bodyPr/>
+      <a:lstStyle/>
+      <a:style>
+        <a:lnRef idx="2">
+          <a:schemeClr val="accent1"/>
+        </a:lnRef>
+        <a:fillRef idx="0">
+          <a:schemeClr val="accent1"/>
+        </a:fillRef>
+        <a:effectRef idx="1">
+          <a:schemeClr val="accent1"/>
+        </a:effectRef>
+        <a:fontRef idx="minor">
+          <a:schemeClr val="tx1"/>
+        </a:fontRef>
+      </a:style>
+    </a:lnDef>
+  </a:objectDefaults>
+  <a:extraClrSchemeLst/>
+  <a:extLst>
+    <a:ext uri="{05A4C25C-085E-4340-85A3-A5531E510DB2}">
+      <thm15:themeFamily xmlns:thm15="http://schemas.microsoft.com/office/thememl/2012/main" name="Office Theme" id="{2E142A2C-CD16-42D6-873A-C26D2A0506FA}" vid="{1BDDFF52-6CD6-40A5-AB3C-68EB2F1E4D0A}"/>
+    </a:ext>
+  </a:extLst>
+</a:theme>
 </file>
</xml_diff>

<commit_message>
updated some diagram actions
</commit_message>
<xml_diff>
--- a/docs/UserInterfaceDesign.pptx
+++ b/docs/UserInterfaceDesign.pptx
@@ -5,11 +5,12 @@
     <p:sldMasterId id="2147483660" r:id="rId1"/>
   </p:sldMasterIdLst>
   <p:notesMasterIdLst>
-    <p:notesMasterId r:id="rId4"/>
+    <p:notesMasterId r:id="rId5"/>
   </p:notesMasterIdLst>
   <p:sldIdLst>
     <p:sldId id="256" r:id="rId2"/>
     <p:sldId id="257" r:id="rId3"/>
+    <p:sldId id="258" r:id="rId4"/>
   </p:sldIdLst>
   <p:sldSz cx="12192000" cy="9144000"/>
   <p:notesSz cx="6858000" cy="9144000"/>
@@ -198,7 +199,7 @@
           <a:p>
             <a:fld id="{FEEF7981-4104-4A44-B089-903C5ACCC29C}" type="datetimeFigureOut">
               <a:rPr lang="en-US" smtClean="0"/>
-              <a:t>2/15/26</a:t>
+              <a:t>2/18/26</a:t>
             </a:fld>
             <a:endParaRPr lang="en-US"/>
           </a:p>
@@ -549,6 +550,114 @@
 </p:notes>
 </file>
 
+<file path=ppt/notesSlides/notesSlide2.xml><?xml version="1.0" encoding="utf-8"?>
+<p:notes xmlns:a="http://schemas.openxmlformats.org/drawingml/2006/main" xmlns:r="http://schemas.openxmlformats.org/officeDocument/2006/relationships" xmlns:p="http://schemas.openxmlformats.org/presentationml/2006/main">
+  <p:cSld>
+    <p:spTree>
+      <p:nvGrpSpPr>
+        <p:cNvPr id="1" name="">
+          <a:extLst>
+            <a:ext uri="{FF2B5EF4-FFF2-40B4-BE49-F238E27FC236}">
+              <a16:creationId xmlns:a16="http://schemas.microsoft.com/office/drawing/2014/main" id="{B2E7AAF8-CBF8-2693-E7E0-53B906928B41}"/>
+            </a:ext>
+          </a:extLst>
+        </p:cNvPr>
+        <p:cNvGrpSpPr/>
+        <p:nvPr/>
+      </p:nvGrpSpPr>
+      <p:grpSpPr>
+        <a:xfrm>
+          <a:off x="0" y="0"/>
+          <a:ext cx="0" cy="0"/>
+          <a:chOff x="0" y="0"/>
+          <a:chExt cx="0" cy="0"/>
+        </a:xfrm>
+      </p:grpSpPr>
+      <p:sp>
+        <p:nvSpPr>
+          <p:cNvPr id="2" name="Slide Image Placeholder 1">
+            <a:extLst>
+              <a:ext uri="{FF2B5EF4-FFF2-40B4-BE49-F238E27FC236}">
+                <a16:creationId xmlns:a16="http://schemas.microsoft.com/office/drawing/2014/main" id="{440C9A44-3C7C-BF7A-7375-DA73E15B4AD0}"/>
+              </a:ext>
+            </a:extLst>
+          </p:cNvPr>
+          <p:cNvSpPr>
+            <a:spLocks noGrp="1" noRot="1" noChangeAspect="1"/>
+          </p:cNvSpPr>
+          <p:nvPr>
+            <p:ph type="sldImg"/>
+          </p:nvPr>
+        </p:nvSpPr>
+        <p:spPr/>
+      </p:sp>
+      <p:sp>
+        <p:nvSpPr>
+          <p:cNvPr id="3" name="Notes Placeholder 2">
+            <a:extLst>
+              <a:ext uri="{FF2B5EF4-FFF2-40B4-BE49-F238E27FC236}">
+                <a16:creationId xmlns:a16="http://schemas.microsoft.com/office/drawing/2014/main" id="{C1715D92-145C-1705-6C31-FC49E821D094}"/>
+              </a:ext>
+            </a:extLst>
+          </p:cNvPr>
+          <p:cNvSpPr>
+            <a:spLocks noGrp="1"/>
+          </p:cNvSpPr>
+          <p:nvPr>
+            <p:ph type="body" idx="1"/>
+          </p:nvPr>
+        </p:nvSpPr>
+        <p:spPr/>
+        <p:txBody>
+          <a:bodyPr/>
+          <a:lstStyle/>
+          <a:p>
+            <a:endParaRPr lang="en-US" dirty="0"/>
+          </a:p>
+        </p:txBody>
+      </p:sp>
+      <p:sp>
+        <p:nvSpPr>
+          <p:cNvPr id="4" name="Slide Number Placeholder 3">
+            <a:extLst>
+              <a:ext uri="{FF2B5EF4-FFF2-40B4-BE49-F238E27FC236}">
+                <a16:creationId xmlns:a16="http://schemas.microsoft.com/office/drawing/2014/main" id="{95FB5897-6108-CE61-D524-972FF30264DC}"/>
+              </a:ext>
+            </a:extLst>
+          </p:cNvPr>
+          <p:cNvSpPr>
+            <a:spLocks noGrp="1"/>
+          </p:cNvSpPr>
+          <p:nvPr>
+            <p:ph type="sldNum" sz="quarter" idx="5"/>
+          </p:nvPr>
+        </p:nvSpPr>
+        <p:spPr/>
+        <p:txBody>
+          <a:bodyPr/>
+          <a:lstStyle/>
+          <a:p>
+            <a:fld id="{179C0A28-BD2D-1A49-A30E-86847D45FDDA}" type="slidenum">
+              <a:rPr lang="en-US" smtClean="0"/>
+              <a:t>3</a:t>
+            </a:fld>
+            <a:endParaRPr lang="en-US"/>
+          </a:p>
+        </p:txBody>
+      </p:sp>
+    </p:spTree>
+    <p:extLst>
+      <p:ext uri="{BB962C8B-B14F-4D97-AF65-F5344CB8AC3E}">
+        <p14:creationId xmlns:p14="http://schemas.microsoft.com/office/powerpoint/2010/main" val="3442121414"/>
+      </p:ext>
+    </p:extLst>
+  </p:cSld>
+  <p:clrMapOvr>
+    <a:masterClrMapping/>
+  </p:clrMapOvr>
+</p:notes>
+</file>
+
 <file path=ppt/slideLayouts/slideLayout1.xml><?xml version="1.0" encoding="utf-8"?>
 <p:sldLayout xmlns:a="http://schemas.openxmlformats.org/drawingml/2006/main" xmlns:r="http://schemas.openxmlformats.org/officeDocument/2006/relationships" xmlns:p="http://schemas.openxmlformats.org/presentationml/2006/main" type="title" preserve="1">
   <p:cSld name="Title Slide">
@@ -680,7 +789,7 @@
           <a:p>
             <a:fld id="{0CEA8DB8-EBFA-8C4D-8FF6-BC8323702808}" type="datetimeFigureOut">
               <a:rPr lang="en-US" smtClean="0"/>
-              <a:t>2/15/26</a:t>
+              <a:t>2/18/26</a:t>
             </a:fld>
             <a:endParaRPr lang="en-US"/>
           </a:p>
@@ -850,7 +959,7 @@
           <a:p>
             <a:fld id="{0CEA8DB8-EBFA-8C4D-8FF6-BC8323702808}" type="datetimeFigureOut">
               <a:rPr lang="en-US" smtClean="0"/>
-              <a:t>2/15/26</a:t>
+              <a:t>2/18/26</a:t>
             </a:fld>
             <a:endParaRPr lang="en-US"/>
           </a:p>
@@ -1030,7 +1139,7 @@
           <a:p>
             <a:fld id="{0CEA8DB8-EBFA-8C4D-8FF6-BC8323702808}" type="datetimeFigureOut">
               <a:rPr lang="en-US" smtClean="0"/>
-              <a:t>2/15/26</a:t>
+              <a:t>2/18/26</a:t>
             </a:fld>
             <a:endParaRPr lang="en-US"/>
           </a:p>
@@ -1200,7 +1309,7 @@
           <a:p>
             <a:fld id="{0CEA8DB8-EBFA-8C4D-8FF6-BC8323702808}" type="datetimeFigureOut">
               <a:rPr lang="en-US" smtClean="0"/>
-              <a:t>2/15/26</a:t>
+              <a:t>2/18/26</a:t>
             </a:fld>
             <a:endParaRPr lang="en-US"/>
           </a:p>
@@ -1444,7 +1553,7 @@
           <a:p>
             <a:fld id="{0CEA8DB8-EBFA-8C4D-8FF6-BC8323702808}" type="datetimeFigureOut">
               <a:rPr lang="en-US" smtClean="0"/>
-              <a:t>2/15/26</a:t>
+              <a:t>2/18/26</a:t>
             </a:fld>
             <a:endParaRPr lang="en-US"/>
           </a:p>
@@ -1676,7 +1785,7 @@
           <a:p>
             <a:fld id="{0CEA8DB8-EBFA-8C4D-8FF6-BC8323702808}" type="datetimeFigureOut">
               <a:rPr lang="en-US" smtClean="0"/>
-              <a:t>2/15/26</a:t>
+              <a:t>2/18/26</a:t>
             </a:fld>
             <a:endParaRPr lang="en-US"/>
           </a:p>
@@ -2043,7 +2152,7 @@
           <a:p>
             <a:fld id="{0CEA8DB8-EBFA-8C4D-8FF6-BC8323702808}" type="datetimeFigureOut">
               <a:rPr lang="en-US" smtClean="0"/>
-              <a:t>2/15/26</a:t>
+              <a:t>2/18/26</a:t>
             </a:fld>
             <a:endParaRPr lang="en-US"/>
           </a:p>
@@ -2161,7 +2270,7 @@
           <a:p>
             <a:fld id="{0CEA8DB8-EBFA-8C4D-8FF6-BC8323702808}" type="datetimeFigureOut">
               <a:rPr lang="en-US" smtClean="0"/>
-              <a:t>2/15/26</a:t>
+              <a:t>2/18/26</a:t>
             </a:fld>
             <a:endParaRPr lang="en-US"/>
           </a:p>
@@ -2256,7 +2365,7 @@
           <a:p>
             <a:fld id="{0CEA8DB8-EBFA-8C4D-8FF6-BC8323702808}" type="datetimeFigureOut">
               <a:rPr lang="en-US" smtClean="0"/>
-              <a:t>2/15/26</a:t>
+              <a:t>2/18/26</a:t>
             </a:fld>
             <a:endParaRPr lang="en-US"/>
           </a:p>
@@ -2533,7 +2642,7 @@
           <a:p>
             <a:fld id="{0CEA8DB8-EBFA-8C4D-8FF6-BC8323702808}" type="datetimeFigureOut">
               <a:rPr lang="en-US" smtClean="0"/>
-              <a:t>2/15/26</a:t>
+              <a:t>2/18/26</a:t>
             </a:fld>
             <a:endParaRPr lang="en-US"/>
           </a:p>
@@ -2790,7 +2899,7 @@
           <a:p>
             <a:fld id="{0CEA8DB8-EBFA-8C4D-8FF6-BC8323702808}" type="datetimeFigureOut">
               <a:rPr lang="en-US" smtClean="0"/>
-              <a:t>2/15/26</a:t>
+              <a:t>2/18/26</a:t>
             </a:fld>
             <a:endParaRPr lang="en-US"/>
           </a:p>
@@ -3003,7 +3112,7 @@
           <a:p>
             <a:fld id="{0CEA8DB8-EBFA-8C4D-8FF6-BC8323702808}" type="datetimeFigureOut">
               <a:rPr lang="en-US" smtClean="0"/>
-              <a:t>2/15/26</a:t>
+              <a:t>2/18/26</a:t>
             </a:fld>
             <a:endParaRPr lang="en-US"/>
           </a:p>
@@ -5831,10 +5940,1491 @@
           </a:p>
         </p:txBody>
       </p:sp>
+      <p:sp>
+        <p:nvSpPr>
+          <p:cNvPr id="2" name="TextBox 1">
+            <a:extLst>
+              <a:ext uri="{FF2B5EF4-FFF2-40B4-BE49-F238E27FC236}">
+                <a16:creationId xmlns:a16="http://schemas.microsoft.com/office/drawing/2014/main" id="{3210A7A0-5A80-4A13-2CBC-171F39025858}"/>
+              </a:ext>
+            </a:extLst>
+          </p:cNvPr>
+          <p:cNvSpPr txBox="1"/>
+          <p:nvPr/>
+        </p:nvSpPr>
+        <p:spPr>
+          <a:xfrm>
+            <a:off x="394266" y="8196190"/>
+            <a:ext cx="11204176" cy="646331"/>
+          </a:xfrm>
+          <a:prstGeom prst="rect">
+            <a:avLst/>
+          </a:prstGeom>
+          <a:noFill/>
+        </p:spPr>
+        <p:txBody>
+          <a:bodyPr wrap="square" rtlCol="0">
+            <a:spAutoFit/>
+          </a:bodyPr>
+          <a:lstStyle/>
+          <a:p>
+            <a:r>
+              <a:rPr lang="en-US" dirty="0"/>
+              <a:t>*: To be implemented in the future. This scheme is too complicated to implement for the time being. See the implementation of shared persistence in the next slide. </a:t>
+            </a:r>
+          </a:p>
+        </p:txBody>
+      </p:sp>
     </p:spTree>
     <p:extLst>
       <p:ext uri="{BB962C8B-B14F-4D97-AF65-F5344CB8AC3E}">
         <p14:creationId xmlns:p14="http://schemas.microsoft.com/office/powerpoint/2010/main" val="4189275845"/>
+      </p:ext>
+    </p:extLst>
+  </p:cSld>
+  <p:clrMapOvr>
+    <a:masterClrMapping/>
+  </p:clrMapOvr>
+</p:sld>
+</file>
+
+<file path=ppt/slides/slide3.xml><?xml version="1.0" encoding="utf-8"?>
+<p:sld xmlns:a="http://schemas.openxmlformats.org/drawingml/2006/main" xmlns:r="http://schemas.openxmlformats.org/officeDocument/2006/relationships" xmlns:p="http://schemas.openxmlformats.org/presentationml/2006/main">
+  <p:cSld>
+    <p:spTree>
+      <p:nvGrpSpPr>
+        <p:cNvPr id="1" name="">
+          <a:extLst>
+            <a:ext uri="{FF2B5EF4-FFF2-40B4-BE49-F238E27FC236}">
+              <a16:creationId xmlns:a16="http://schemas.microsoft.com/office/drawing/2014/main" id="{28616064-4D58-2187-D546-D1A5168AB959}"/>
+            </a:ext>
+          </a:extLst>
+        </p:cNvPr>
+        <p:cNvGrpSpPr/>
+        <p:nvPr/>
+      </p:nvGrpSpPr>
+      <p:grpSpPr>
+        <a:xfrm>
+          <a:off x="0" y="0"/>
+          <a:ext cx="0" cy="0"/>
+          <a:chOff x="0" y="0"/>
+          <a:chExt cx="0" cy="0"/>
+        </a:xfrm>
+      </p:grpSpPr>
+      <p:sp>
+        <p:nvSpPr>
+          <p:cNvPr id="4" name="Rectangle 3">
+            <a:extLst>
+              <a:ext uri="{FF2B5EF4-FFF2-40B4-BE49-F238E27FC236}">
+                <a16:creationId xmlns:a16="http://schemas.microsoft.com/office/drawing/2014/main" id="{41DDB144-ABBE-455A-EBE0-8CE51192667C}"/>
+              </a:ext>
+            </a:extLst>
+          </p:cNvPr>
+          <p:cNvSpPr/>
+          <p:nvPr/>
+        </p:nvSpPr>
+        <p:spPr>
+          <a:xfrm>
+            <a:off x="700542" y="1876527"/>
+            <a:ext cx="1790298" cy="462012"/>
+          </a:xfrm>
+          <a:prstGeom prst="rect">
+            <a:avLst/>
+          </a:prstGeom>
+        </p:spPr>
+        <p:style>
+          <a:lnRef idx="2">
+            <a:schemeClr val="accent1">
+              <a:shade val="15000"/>
+            </a:schemeClr>
+          </a:lnRef>
+          <a:fillRef idx="1">
+            <a:schemeClr val="accent1"/>
+          </a:fillRef>
+          <a:effectRef idx="0">
+            <a:schemeClr val="accent1"/>
+          </a:effectRef>
+          <a:fontRef idx="minor">
+            <a:schemeClr val="lt1"/>
+          </a:fontRef>
+        </p:style>
+        <p:txBody>
+          <a:bodyPr rtlCol="0" anchor="ctr"/>
+          <a:lstStyle/>
+          <a:p>
+            <a:pPr algn="ctr"/>
+            <a:r>
+              <a:rPr lang="en-US" sz="1400" dirty="0"/>
+              <a:t>Diagram </a:t>
+            </a:r>
+            <a:r>
+              <a:rPr lang="en-US" sz="1400" dirty="0" err="1"/>
+              <a:t>json</a:t>
+            </a:r>
+            <a:r>
+              <a:rPr lang="en-US" sz="1400" dirty="0"/>
+              <a:t> (Pathway - normal)</a:t>
+            </a:r>
+          </a:p>
+        </p:txBody>
+      </p:sp>
+      <p:sp>
+        <p:nvSpPr>
+          <p:cNvPr id="5" name="Rectangle 4">
+            <a:extLst>
+              <a:ext uri="{FF2B5EF4-FFF2-40B4-BE49-F238E27FC236}">
+                <a16:creationId xmlns:a16="http://schemas.microsoft.com/office/drawing/2014/main" id="{59F23337-E2E9-3763-5A65-F9F151E4C443}"/>
+              </a:ext>
+            </a:extLst>
+          </p:cNvPr>
+          <p:cNvSpPr/>
+          <p:nvPr/>
+        </p:nvSpPr>
+        <p:spPr>
+          <a:xfrm>
+            <a:off x="3909727" y="3458541"/>
+            <a:ext cx="1790298" cy="462012"/>
+          </a:xfrm>
+          <a:prstGeom prst="rect">
+            <a:avLst/>
+          </a:prstGeom>
+        </p:spPr>
+        <p:style>
+          <a:lnRef idx="2">
+            <a:schemeClr val="accent2">
+              <a:shade val="15000"/>
+            </a:schemeClr>
+          </a:lnRef>
+          <a:fillRef idx="1">
+            <a:schemeClr val="accent2"/>
+          </a:fillRef>
+          <a:effectRef idx="0">
+            <a:schemeClr val="accent2"/>
+          </a:effectRef>
+          <a:fontRef idx="minor">
+            <a:schemeClr val="lt1"/>
+          </a:fontRef>
+        </p:style>
+        <p:txBody>
+          <a:bodyPr rtlCol="0" anchor="ctr"/>
+          <a:lstStyle/>
+          <a:p>
+            <a:pPr algn="ctr"/>
+            <a:r>
+              <a:rPr lang="en-US" sz="1400" dirty="0"/>
+              <a:t>Diagram </a:t>
+            </a:r>
+            <a:r>
+              <a:rPr lang="en-US" sz="1400" dirty="0" err="1"/>
+              <a:t>json</a:t>
+            </a:r>
+            <a:r>
+              <a:rPr lang="en-US" sz="1400" dirty="0"/>
+              <a:t> (</a:t>
+            </a:r>
+            <a:r>
+              <a:rPr lang="en-US" sz="1400" dirty="0" err="1"/>
+              <a:t>PathwayDiagram</a:t>
+            </a:r>
+            <a:r>
+              <a:rPr lang="en-US" sz="1400" dirty="0"/>
+              <a:t>)</a:t>
+            </a:r>
+          </a:p>
+        </p:txBody>
+      </p:sp>
+      <p:sp>
+        <p:nvSpPr>
+          <p:cNvPr id="6" name="Rectangle 5">
+            <a:extLst>
+              <a:ext uri="{FF2B5EF4-FFF2-40B4-BE49-F238E27FC236}">
+                <a16:creationId xmlns:a16="http://schemas.microsoft.com/office/drawing/2014/main" id="{E6A88C66-2645-6DB4-F3FE-53B121503692}"/>
+              </a:ext>
+            </a:extLst>
+          </p:cNvPr>
+          <p:cNvSpPr/>
+          <p:nvPr/>
+        </p:nvSpPr>
+        <p:spPr>
+          <a:xfrm>
+            <a:off x="3616997" y="1876526"/>
+            <a:ext cx="1790298" cy="462012"/>
+          </a:xfrm>
+          <a:prstGeom prst="rect">
+            <a:avLst/>
+          </a:prstGeom>
+        </p:spPr>
+        <p:style>
+          <a:lnRef idx="2">
+            <a:schemeClr val="accent1">
+              <a:shade val="15000"/>
+            </a:schemeClr>
+          </a:lnRef>
+          <a:fillRef idx="1">
+            <a:schemeClr val="accent1"/>
+          </a:fillRef>
+          <a:effectRef idx="0">
+            <a:schemeClr val="accent1"/>
+          </a:effectRef>
+          <a:fontRef idx="minor">
+            <a:schemeClr val="lt1"/>
+          </a:fontRef>
+        </p:style>
+        <p:txBody>
+          <a:bodyPr rtlCol="0" anchor="ctr"/>
+          <a:lstStyle/>
+          <a:p>
+            <a:pPr algn="ctr"/>
+            <a:r>
+              <a:rPr lang="en-US" sz="1400" dirty="0"/>
+              <a:t>Diagram </a:t>
+            </a:r>
+            <a:r>
+              <a:rPr lang="en-US" sz="1400" dirty="0" err="1"/>
+              <a:t>json</a:t>
+            </a:r>
+            <a:r>
+              <a:rPr lang="en-US" sz="1400" dirty="0"/>
+              <a:t> (Pathway - disease)</a:t>
+            </a:r>
+          </a:p>
+        </p:txBody>
+      </p:sp>
+      <p:sp>
+        <p:nvSpPr>
+          <p:cNvPr id="8" name="Rectangle 7">
+            <a:extLst>
+              <a:ext uri="{FF2B5EF4-FFF2-40B4-BE49-F238E27FC236}">
+                <a16:creationId xmlns:a16="http://schemas.microsoft.com/office/drawing/2014/main" id="{FA6B54A0-3EED-A485-BBC3-2B45E97FD46A}"/>
+              </a:ext>
+            </a:extLst>
+          </p:cNvPr>
+          <p:cNvSpPr/>
+          <p:nvPr/>
+        </p:nvSpPr>
+        <p:spPr>
+          <a:xfrm>
+            <a:off x="9810855" y="3796499"/>
+            <a:ext cx="2098307" cy="1647521"/>
+          </a:xfrm>
+          <a:prstGeom prst="rect">
+            <a:avLst/>
+          </a:prstGeom>
+        </p:spPr>
+        <p:style>
+          <a:lnRef idx="2">
+            <a:schemeClr val="accent3">
+              <a:shade val="15000"/>
+            </a:schemeClr>
+          </a:lnRef>
+          <a:fillRef idx="1">
+            <a:schemeClr val="accent3"/>
+          </a:fillRef>
+          <a:effectRef idx="0">
+            <a:schemeClr val="accent3"/>
+          </a:effectRef>
+          <a:fontRef idx="minor">
+            <a:schemeClr val="lt1"/>
+          </a:fontRef>
+        </p:style>
+        <p:txBody>
+          <a:bodyPr rtlCol="0" anchor="ctr"/>
+          <a:lstStyle/>
+          <a:p>
+            <a:pPr algn="ctr"/>
+            <a:r>
+              <a:rPr lang="en-US" dirty="0" err="1"/>
+              <a:t>PathwayDiagram</a:t>
+            </a:r>
+            <a:r>
+              <a:rPr lang="en-US" dirty="0"/>
+              <a:t> Widget (</a:t>
+            </a:r>
+            <a:r>
+              <a:rPr lang="en-US" dirty="0" err="1"/>
+              <a:t>cytoscape.js</a:t>
+            </a:r>
+            <a:r>
+              <a:rPr lang="en-US" dirty="0"/>
+              <a:t>)</a:t>
+            </a:r>
+          </a:p>
+        </p:txBody>
+      </p:sp>
+      <p:sp>
+        <p:nvSpPr>
+          <p:cNvPr id="9" name="Rectangle 8">
+            <a:extLst>
+              <a:ext uri="{FF2B5EF4-FFF2-40B4-BE49-F238E27FC236}">
+                <a16:creationId xmlns:a16="http://schemas.microsoft.com/office/drawing/2014/main" id="{62C506DF-51DE-F7FA-73CB-5E611EB7B3CC}"/>
+              </a:ext>
+            </a:extLst>
+          </p:cNvPr>
+          <p:cNvSpPr/>
+          <p:nvPr/>
+        </p:nvSpPr>
+        <p:spPr>
+          <a:xfrm>
+            <a:off x="500016" y="1580543"/>
+            <a:ext cx="5592278" cy="4138900"/>
+          </a:xfrm>
+          <a:prstGeom prst="rect">
+            <a:avLst/>
+          </a:prstGeom>
+          <a:noFill/>
+        </p:spPr>
+        <p:style>
+          <a:lnRef idx="2">
+            <a:schemeClr val="accent1">
+              <a:shade val="15000"/>
+            </a:schemeClr>
+          </a:lnRef>
+          <a:fillRef idx="1">
+            <a:schemeClr val="accent1"/>
+          </a:fillRef>
+          <a:effectRef idx="0">
+            <a:schemeClr val="accent1"/>
+          </a:effectRef>
+          <a:fontRef idx="minor">
+            <a:schemeClr val="lt1"/>
+          </a:fontRef>
+        </p:style>
+        <p:txBody>
+          <a:bodyPr rtlCol="0" anchor="ctr"/>
+          <a:lstStyle/>
+          <a:p>
+            <a:pPr algn="ctr"/>
+            <a:endParaRPr lang="en-US"/>
+          </a:p>
+        </p:txBody>
+      </p:sp>
+      <p:sp>
+        <p:nvSpPr>
+          <p:cNvPr id="11" name="Rounded Rectangle 10">
+            <a:extLst>
+              <a:ext uri="{FF2B5EF4-FFF2-40B4-BE49-F238E27FC236}">
+                <a16:creationId xmlns:a16="http://schemas.microsoft.com/office/drawing/2014/main" id="{7352C8B1-58D6-34FA-19B5-DC10B09B29C0}"/>
+              </a:ext>
+            </a:extLst>
+          </p:cNvPr>
+          <p:cNvSpPr/>
+          <p:nvPr/>
+        </p:nvSpPr>
+        <p:spPr>
+          <a:xfrm>
+            <a:off x="1326142" y="3586866"/>
+            <a:ext cx="1310641" cy="529389"/>
+          </a:xfrm>
+          <a:prstGeom prst="roundRect">
+            <a:avLst/>
+          </a:prstGeom>
+          <a:solidFill>
+            <a:schemeClr val="accent3">
+              <a:lumMod val="60000"/>
+              <a:lumOff val="40000"/>
+            </a:schemeClr>
+          </a:solidFill>
+        </p:spPr>
+        <p:style>
+          <a:lnRef idx="2">
+            <a:schemeClr val="accent1">
+              <a:shade val="15000"/>
+            </a:schemeClr>
+          </a:lnRef>
+          <a:fillRef idx="1">
+            <a:schemeClr val="accent1"/>
+          </a:fillRef>
+          <a:effectRef idx="0">
+            <a:schemeClr val="accent1"/>
+          </a:effectRef>
+          <a:fontRef idx="minor">
+            <a:schemeClr val="lt1"/>
+          </a:fontRef>
+        </p:style>
+        <p:txBody>
+          <a:bodyPr rtlCol="0" anchor="ctr"/>
+          <a:lstStyle/>
+          <a:p>
+            <a:pPr algn="ctr"/>
+            <a:r>
+              <a:rPr lang="en-US" sz="1200" dirty="0" err="1"/>
+              <a:t>PathwayDiagram</a:t>
+            </a:r>
+            <a:r>
+              <a:rPr lang="en-US" sz="1200" dirty="0"/>
+              <a:t> (instance)</a:t>
+            </a:r>
+          </a:p>
+        </p:txBody>
+      </p:sp>
+      <p:sp>
+        <p:nvSpPr>
+          <p:cNvPr id="12" name="TextBox 11">
+            <a:extLst>
+              <a:ext uri="{FF2B5EF4-FFF2-40B4-BE49-F238E27FC236}">
+                <a16:creationId xmlns:a16="http://schemas.microsoft.com/office/drawing/2014/main" id="{C15669FE-080A-CFFD-48B8-AB8FC11F9EBE}"/>
+              </a:ext>
+            </a:extLst>
+          </p:cNvPr>
+          <p:cNvSpPr txBox="1"/>
+          <p:nvPr/>
+        </p:nvSpPr>
+        <p:spPr>
+          <a:xfrm>
+            <a:off x="455223" y="5186194"/>
+            <a:ext cx="1535870" cy="461665"/>
+          </a:xfrm>
+          <a:prstGeom prst="rect">
+            <a:avLst/>
+          </a:prstGeom>
+          <a:noFill/>
+        </p:spPr>
+        <p:txBody>
+          <a:bodyPr wrap="none" rtlCol="0">
+            <a:spAutoFit/>
+          </a:bodyPr>
+          <a:lstStyle/>
+          <a:p>
+            <a:pPr algn="ctr"/>
+            <a:r>
+              <a:rPr lang="en-US" sz="1200" b="1" u="sng" dirty="0"/>
+              <a:t>Shared central space </a:t>
+            </a:r>
+          </a:p>
+          <a:p>
+            <a:pPr algn="ctr"/>
+            <a:r>
+              <a:rPr lang="en-US" sz="1200" b="1" u="sng" dirty="0"/>
+              <a:t>(</a:t>
+            </a:r>
+            <a:r>
+              <a:rPr lang="en-US" sz="1200" b="1" u="sng" dirty="0" err="1"/>
+              <a:t>db</a:t>
+            </a:r>
+            <a:r>
+              <a:rPr lang="en-US" sz="1200" b="1" u="sng" dirty="0"/>
+              <a:t> and files)</a:t>
+            </a:r>
+          </a:p>
+        </p:txBody>
+      </p:sp>
+      <p:cxnSp>
+        <p:nvCxnSpPr>
+          <p:cNvPr id="15" name="Elbow Connector 14">
+            <a:extLst>
+              <a:ext uri="{FF2B5EF4-FFF2-40B4-BE49-F238E27FC236}">
+                <a16:creationId xmlns:a16="http://schemas.microsoft.com/office/drawing/2014/main" id="{1A5AD7D9-3DD6-F649-2444-822A69EBD974}"/>
+              </a:ext>
+            </a:extLst>
+          </p:cNvPr>
+          <p:cNvCxnSpPr>
+            <a:cxnSpLocks/>
+            <a:stCxn id="8" idx="0"/>
+            <a:endCxn id="4" idx="0"/>
+          </p:cNvCxnSpPr>
+          <p:nvPr/>
+        </p:nvCxnSpPr>
+        <p:spPr>
+          <a:xfrm rot="16200000" flipV="1">
+            <a:off x="5267864" y="-1795646"/>
+            <a:ext cx="1919972" cy="9264318"/>
+          </a:xfrm>
+          <a:prstGeom prst="bentConnector3">
+            <a:avLst>
+              <a:gd name="adj1" fmla="val 111906"/>
+            </a:avLst>
+          </a:prstGeom>
+          <a:ln w="12700">
+            <a:headEnd type="triangle"/>
+            <a:tailEnd type="none"/>
+          </a:ln>
+        </p:spPr>
+        <p:style>
+          <a:lnRef idx="1">
+            <a:schemeClr val="accent1"/>
+          </a:lnRef>
+          <a:fillRef idx="0">
+            <a:schemeClr val="accent1"/>
+          </a:fillRef>
+          <a:effectRef idx="0">
+            <a:schemeClr val="accent1"/>
+          </a:effectRef>
+          <a:fontRef idx="minor">
+            <a:schemeClr val="tx1"/>
+          </a:fontRef>
+        </p:style>
+      </p:cxnSp>
+      <p:cxnSp>
+        <p:nvCxnSpPr>
+          <p:cNvPr id="16" name="Elbow Connector 15">
+            <a:extLst>
+              <a:ext uri="{FF2B5EF4-FFF2-40B4-BE49-F238E27FC236}">
+                <a16:creationId xmlns:a16="http://schemas.microsoft.com/office/drawing/2014/main" id="{785C53D4-5181-559B-283C-FDFF56429873}"/>
+              </a:ext>
+            </a:extLst>
+          </p:cNvPr>
+          <p:cNvCxnSpPr>
+            <a:cxnSpLocks/>
+            <a:stCxn id="8" idx="0"/>
+            <a:endCxn id="6" idx="3"/>
+          </p:cNvCxnSpPr>
+          <p:nvPr/>
+        </p:nvCxnSpPr>
+        <p:spPr>
+          <a:xfrm rot="16200000" flipV="1">
+            <a:off x="7289169" y="225659"/>
+            <a:ext cx="1688967" cy="5452714"/>
+          </a:xfrm>
+          <a:prstGeom prst="bentConnector2">
+            <a:avLst/>
+          </a:prstGeom>
+          <a:ln w="12700">
+            <a:headEnd type="triangle"/>
+            <a:tailEnd type="none"/>
+          </a:ln>
+        </p:spPr>
+        <p:style>
+          <a:lnRef idx="1">
+            <a:schemeClr val="accent1"/>
+          </a:lnRef>
+          <a:fillRef idx="0">
+            <a:schemeClr val="accent1"/>
+          </a:fillRef>
+          <a:effectRef idx="0">
+            <a:schemeClr val="accent1"/>
+          </a:effectRef>
+          <a:fontRef idx="minor">
+            <a:schemeClr val="tx1"/>
+          </a:fontRef>
+        </p:style>
+      </p:cxnSp>
+      <p:sp>
+        <p:nvSpPr>
+          <p:cNvPr id="19" name="TextBox 18">
+            <a:extLst>
+              <a:ext uri="{FF2B5EF4-FFF2-40B4-BE49-F238E27FC236}">
+                <a16:creationId xmlns:a16="http://schemas.microsoft.com/office/drawing/2014/main" id="{01643BAC-637F-F9C3-F0A1-2B64694EE65E}"/>
+              </a:ext>
+            </a:extLst>
+          </p:cNvPr>
+          <p:cNvSpPr txBox="1"/>
+          <p:nvPr/>
+        </p:nvSpPr>
+        <p:spPr>
+          <a:xfrm>
+            <a:off x="7221033" y="1385158"/>
+            <a:ext cx="1504899" cy="276999"/>
+          </a:xfrm>
+          <a:prstGeom prst="rect">
+            <a:avLst/>
+          </a:prstGeom>
+          <a:noFill/>
+        </p:spPr>
+        <p:txBody>
+          <a:bodyPr wrap="none" rtlCol="0">
+            <a:spAutoFit/>
+          </a:bodyPr>
+          <a:lstStyle/>
+          <a:p>
+            <a:r>
+              <a:rPr lang="en-US" sz="1200" dirty="0"/>
+              <a:t>load normal pathway</a:t>
+            </a:r>
+          </a:p>
+        </p:txBody>
+      </p:sp>
+      <p:sp>
+        <p:nvSpPr>
+          <p:cNvPr id="20" name="TextBox 19">
+            <a:extLst>
+              <a:ext uri="{FF2B5EF4-FFF2-40B4-BE49-F238E27FC236}">
+                <a16:creationId xmlns:a16="http://schemas.microsoft.com/office/drawing/2014/main" id="{939CB790-45AC-276D-2FD4-9F1E4F5CF6A7}"/>
+              </a:ext>
+            </a:extLst>
+          </p:cNvPr>
+          <p:cNvSpPr txBox="1"/>
+          <p:nvPr/>
+        </p:nvSpPr>
+        <p:spPr>
+          <a:xfrm>
+            <a:off x="6640936" y="1844800"/>
+            <a:ext cx="2945329" cy="276999"/>
+          </a:xfrm>
+          <a:prstGeom prst="rect">
+            <a:avLst/>
+          </a:prstGeom>
+          <a:noFill/>
+        </p:spPr>
+        <p:txBody>
+          <a:bodyPr wrap="square" rtlCol="0">
+            <a:spAutoFit/>
+          </a:bodyPr>
+          <a:lstStyle/>
+          <a:p>
+            <a:r>
+              <a:rPr lang="en-US" sz="1200" dirty="0"/>
+              <a:t>load disease pathway (comparison enabled)</a:t>
+            </a:r>
+          </a:p>
+        </p:txBody>
+      </p:sp>
+      <p:sp>
+        <p:nvSpPr>
+          <p:cNvPr id="21" name="TextBox 20">
+            <a:extLst>
+              <a:ext uri="{FF2B5EF4-FFF2-40B4-BE49-F238E27FC236}">
+                <a16:creationId xmlns:a16="http://schemas.microsoft.com/office/drawing/2014/main" id="{47484488-4536-D28F-A63F-48659FDBF233}"/>
+              </a:ext>
+            </a:extLst>
+          </p:cNvPr>
+          <p:cNvSpPr txBox="1"/>
+          <p:nvPr/>
+        </p:nvSpPr>
+        <p:spPr>
+          <a:xfrm>
+            <a:off x="9598850" y="2549238"/>
+            <a:ext cx="1248573" cy="646331"/>
+          </a:xfrm>
+          <a:prstGeom prst="rect">
+            <a:avLst/>
+          </a:prstGeom>
+          <a:noFill/>
+        </p:spPr>
+        <p:txBody>
+          <a:bodyPr wrap="square" rtlCol="0">
+            <a:spAutoFit/>
+          </a:bodyPr>
+          <a:lstStyle/>
+          <a:p>
+            <a:pPr algn="ctr"/>
+            <a:r>
+              <a:rPr lang="en-US" sz="1200" dirty="0"/>
+              <a:t>Convert diagram </a:t>
+            </a:r>
+            <a:r>
+              <a:rPr lang="en-US" sz="1200" dirty="0" err="1"/>
+              <a:t>json</a:t>
+            </a:r>
+            <a:r>
+              <a:rPr lang="en-US" sz="1200" dirty="0"/>
+              <a:t> to </a:t>
+            </a:r>
+            <a:r>
+              <a:rPr lang="en-US" sz="1200" dirty="0" err="1"/>
+              <a:t>cytosacpe.js</a:t>
+            </a:r>
+            <a:r>
+              <a:rPr lang="en-US" sz="1200" dirty="0"/>
+              <a:t> </a:t>
+            </a:r>
+            <a:r>
+              <a:rPr lang="en-US" sz="1200" dirty="0" err="1"/>
+              <a:t>json</a:t>
+            </a:r>
+            <a:endParaRPr lang="en-US" sz="1200" dirty="0"/>
+          </a:p>
+        </p:txBody>
+      </p:sp>
+      <p:sp>
+        <p:nvSpPr>
+          <p:cNvPr id="29" name="TextBox 28">
+            <a:extLst>
+              <a:ext uri="{FF2B5EF4-FFF2-40B4-BE49-F238E27FC236}">
+                <a16:creationId xmlns:a16="http://schemas.microsoft.com/office/drawing/2014/main" id="{8EE6CCFA-BC78-4A9B-EC90-2132444EB8CF}"/>
+              </a:ext>
+            </a:extLst>
+          </p:cNvPr>
+          <p:cNvSpPr txBox="1"/>
+          <p:nvPr/>
+        </p:nvSpPr>
+        <p:spPr>
+          <a:xfrm>
+            <a:off x="6481621" y="3056126"/>
+            <a:ext cx="3104644" cy="646331"/>
+          </a:xfrm>
+          <a:prstGeom prst="rect">
+            <a:avLst/>
+          </a:prstGeom>
+          <a:noFill/>
+        </p:spPr>
+        <p:txBody>
+          <a:bodyPr wrap="square" rtlCol="0">
+            <a:spAutoFit/>
+          </a:bodyPr>
+          <a:lstStyle/>
+          <a:p>
+            <a:pPr algn="ctr"/>
+            <a:r>
+              <a:rPr lang="en-US" sz="1200" dirty="0"/>
+              <a:t>Load </a:t>
+            </a:r>
+            <a:r>
+              <a:rPr lang="en-US" sz="1200" dirty="0" err="1"/>
+              <a:t>json</a:t>
+            </a:r>
+            <a:r>
+              <a:rPr lang="en-US" sz="1200" dirty="0"/>
+              <a:t> for pathway diagram when ”enable edit” is called if no </a:t>
+            </a:r>
+            <a:r>
+              <a:rPr lang="en-US" sz="1200" dirty="0" err="1"/>
+              <a:t>cytoscape.js</a:t>
+            </a:r>
+            <a:r>
+              <a:rPr lang="en-US" sz="1200" dirty="0"/>
+              <a:t> (1st choice) exists</a:t>
+            </a:r>
+          </a:p>
+        </p:txBody>
+      </p:sp>
+      <p:sp>
+        <p:nvSpPr>
+          <p:cNvPr id="40" name="TextBox 39">
+            <a:extLst>
+              <a:ext uri="{FF2B5EF4-FFF2-40B4-BE49-F238E27FC236}">
+                <a16:creationId xmlns:a16="http://schemas.microsoft.com/office/drawing/2014/main" id="{50F950DB-BEB3-86C5-2122-EEE16D81FF4B}"/>
+              </a:ext>
+            </a:extLst>
+          </p:cNvPr>
+          <p:cNvSpPr txBox="1"/>
+          <p:nvPr/>
+        </p:nvSpPr>
+        <p:spPr>
+          <a:xfrm>
+            <a:off x="7604913" y="4359785"/>
+            <a:ext cx="1251587" cy="276999"/>
+          </a:xfrm>
+          <a:prstGeom prst="rect">
+            <a:avLst/>
+          </a:prstGeom>
+          <a:noFill/>
+        </p:spPr>
+        <p:txBody>
+          <a:bodyPr wrap="square" rtlCol="0">
+            <a:spAutoFit/>
+          </a:bodyPr>
+          <a:lstStyle/>
+          <a:p>
+            <a:pPr algn="ctr"/>
+            <a:r>
+              <a:rPr lang="en-US" sz="1200" dirty="0"/>
+              <a:t>Load for editing</a:t>
+            </a:r>
+          </a:p>
+        </p:txBody>
+      </p:sp>
+      <p:sp>
+        <p:nvSpPr>
+          <p:cNvPr id="44" name="Rectangle 43">
+            <a:extLst>
+              <a:ext uri="{FF2B5EF4-FFF2-40B4-BE49-F238E27FC236}">
+                <a16:creationId xmlns:a16="http://schemas.microsoft.com/office/drawing/2014/main" id="{A306D982-1004-F78C-F3A2-995555AD4831}"/>
+              </a:ext>
+            </a:extLst>
+          </p:cNvPr>
+          <p:cNvSpPr/>
+          <p:nvPr/>
+        </p:nvSpPr>
+        <p:spPr>
+          <a:xfrm>
+            <a:off x="2155562" y="4389381"/>
+            <a:ext cx="1790298" cy="462012"/>
+          </a:xfrm>
+          <a:prstGeom prst="rect">
+            <a:avLst/>
+          </a:prstGeom>
+        </p:spPr>
+        <p:style>
+          <a:lnRef idx="2">
+            <a:schemeClr val="accent2">
+              <a:shade val="15000"/>
+            </a:schemeClr>
+          </a:lnRef>
+          <a:fillRef idx="1">
+            <a:schemeClr val="accent2"/>
+          </a:fillRef>
+          <a:effectRef idx="0">
+            <a:schemeClr val="accent2"/>
+          </a:effectRef>
+          <a:fontRef idx="minor">
+            <a:schemeClr val="lt1"/>
+          </a:fontRef>
+        </p:style>
+        <p:txBody>
+          <a:bodyPr rtlCol="0" anchor="ctr"/>
+          <a:lstStyle/>
+          <a:p>
+            <a:pPr algn="ctr"/>
+            <a:r>
+              <a:rPr lang="en-US" sz="1400" dirty="0" err="1"/>
+              <a:t>Cytoscape.js</a:t>
+            </a:r>
+            <a:r>
+              <a:rPr lang="en-US" sz="1400" dirty="0"/>
+              <a:t> </a:t>
+            </a:r>
+            <a:r>
+              <a:rPr lang="en-US" sz="1400" dirty="0" err="1"/>
+              <a:t>json</a:t>
+            </a:r>
+            <a:r>
+              <a:rPr lang="en-US" sz="1400" dirty="0"/>
+              <a:t> (</a:t>
+            </a:r>
+            <a:r>
+              <a:rPr lang="en-US" sz="1400" dirty="0" err="1"/>
+              <a:t>PathwayDiagram</a:t>
+            </a:r>
+            <a:r>
+              <a:rPr lang="en-US" sz="1400" dirty="0"/>
+              <a:t>)</a:t>
+            </a:r>
+          </a:p>
+        </p:txBody>
+      </p:sp>
+      <p:cxnSp>
+        <p:nvCxnSpPr>
+          <p:cNvPr id="67" name="Elbow Connector 66">
+            <a:extLst>
+              <a:ext uri="{FF2B5EF4-FFF2-40B4-BE49-F238E27FC236}">
+                <a16:creationId xmlns:a16="http://schemas.microsoft.com/office/drawing/2014/main" id="{4C8CCFC8-A6EB-55C3-9098-6723B0875B6C}"/>
+              </a:ext>
+            </a:extLst>
+          </p:cNvPr>
+          <p:cNvCxnSpPr>
+            <a:cxnSpLocks/>
+            <a:stCxn id="44" idx="3"/>
+            <a:endCxn id="8" idx="1"/>
+          </p:cNvCxnSpPr>
+          <p:nvPr/>
+        </p:nvCxnSpPr>
+        <p:spPr>
+          <a:xfrm flipV="1">
+            <a:off x="3945860" y="4620260"/>
+            <a:ext cx="5864995" cy="127"/>
+          </a:xfrm>
+          <a:prstGeom prst="bentConnector3">
+            <a:avLst>
+              <a:gd name="adj1" fmla="val 50000"/>
+            </a:avLst>
+          </a:prstGeom>
+          <a:ln w="12700">
+            <a:tailEnd type="triangle"/>
+          </a:ln>
+        </p:spPr>
+        <p:style>
+          <a:lnRef idx="1">
+            <a:schemeClr val="accent1"/>
+          </a:lnRef>
+          <a:fillRef idx="0">
+            <a:schemeClr val="accent1"/>
+          </a:fillRef>
+          <a:effectRef idx="0">
+            <a:schemeClr val="accent1"/>
+          </a:effectRef>
+          <a:fontRef idx="minor">
+            <a:schemeClr val="tx1"/>
+          </a:fontRef>
+        </p:style>
+      </p:cxnSp>
+      <p:cxnSp>
+        <p:nvCxnSpPr>
+          <p:cNvPr id="68" name="Elbow Connector 67">
+            <a:extLst>
+              <a:ext uri="{FF2B5EF4-FFF2-40B4-BE49-F238E27FC236}">
+                <a16:creationId xmlns:a16="http://schemas.microsoft.com/office/drawing/2014/main" id="{245C81A4-918E-52C4-03D3-78DF5509949C}"/>
+              </a:ext>
+            </a:extLst>
+          </p:cNvPr>
+          <p:cNvCxnSpPr>
+            <a:cxnSpLocks/>
+            <a:stCxn id="5" idx="3"/>
+            <a:endCxn id="8" idx="0"/>
+          </p:cNvCxnSpPr>
+          <p:nvPr/>
+        </p:nvCxnSpPr>
+        <p:spPr>
+          <a:xfrm>
+            <a:off x="5700025" y="3689547"/>
+            <a:ext cx="5159984" cy="106952"/>
+          </a:xfrm>
+          <a:prstGeom prst="bentConnector2">
+            <a:avLst/>
+          </a:prstGeom>
+          <a:ln w="12700">
+            <a:tailEnd type="triangle"/>
+          </a:ln>
+        </p:spPr>
+        <p:style>
+          <a:lnRef idx="1">
+            <a:schemeClr val="accent1"/>
+          </a:lnRef>
+          <a:fillRef idx="0">
+            <a:schemeClr val="accent1"/>
+          </a:fillRef>
+          <a:effectRef idx="0">
+            <a:schemeClr val="accent1"/>
+          </a:effectRef>
+          <a:fontRef idx="minor">
+            <a:schemeClr val="tx1"/>
+          </a:fontRef>
+        </p:style>
+      </p:cxnSp>
+      <p:sp>
+        <p:nvSpPr>
+          <p:cNvPr id="79" name="TextBox 78">
+            <a:extLst>
+              <a:ext uri="{FF2B5EF4-FFF2-40B4-BE49-F238E27FC236}">
+                <a16:creationId xmlns:a16="http://schemas.microsoft.com/office/drawing/2014/main" id="{DFA5DDF6-D9B3-F4B8-92DE-6D6F1CD19F95}"/>
+              </a:ext>
+            </a:extLst>
+          </p:cNvPr>
+          <p:cNvSpPr txBox="1"/>
+          <p:nvPr/>
+        </p:nvSpPr>
+        <p:spPr>
+          <a:xfrm>
+            <a:off x="3945860" y="4589573"/>
+            <a:ext cx="2098306" cy="276999"/>
+          </a:xfrm>
+          <a:prstGeom prst="rect">
+            <a:avLst/>
+          </a:prstGeom>
+          <a:noFill/>
+        </p:spPr>
+        <p:txBody>
+          <a:bodyPr wrap="square" rtlCol="0">
+            <a:spAutoFit/>
+          </a:bodyPr>
+          <a:lstStyle/>
+          <a:p>
+            <a:pPr algn="ctr"/>
+            <a:r>
+              <a:rPr lang="en-US" sz="1200" dirty="0"/>
+              <a:t>first choice for editing</a:t>
+            </a:r>
+          </a:p>
+        </p:txBody>
+      </p:sp>
+      <p:cxnSp>
+        <p:nvCxnSpPr>
+          <p:cNvPr id="84" name="Elbow Connector 83">
+            <a:extLst>
+              <a:ext uri="{FF2B5EF4-FFF2-40B4-BE49-F238E27FC236}">
+                <a16:creationId xmlns:a16="http://schemas.microsoft.com/office/drawing/2014/main" id="{E126A007-9DDB-B367-C36C-A6900661FEC4}"/>
+              </a:ext>
+            </a:extLst>
+          </p:cNvPr>
+          <p:cNvCxnSpPr>
+            <a:cxnSpLocks/>
+            <a:stCxn id="44" idx="0"/>
+            <a:endCxn id="6" idx="2"/>
+          </p:cNvCxnSpPr>
+          <p:nvPr/>
+        </p:nvCxnSpPr>
+        <p:spPr>
+          <a:xfrm rot="5400000" flipH="1" flipV="1">
+            <a:off x="2756007" y="2633243"/>
+            <a:ext cx="2050843" cy="1461435"/>
+          </a:xfrm>
+          <a:prstGeom prst="bentConnector3">
+            <a:avLst>
+              <a:gd name="adj1" fmla="val 50000"/>
+            </a:avLst>
+          </a:prstGeom>
+          <a:ln w="9525">
+            <a:solidFill>
+              <a:srgbClr val="C00000"/>
+            </a:solidFill>
+            <a:tailEnd type="triangle"/>
+          </a:ln>
+        </p:spPr>
+        <p:style>
+          <a:lnRef idx="1">
+            <a:schemeClr val="accent1"/>
+          </a:lnRef>
+          <a:fillRef idx="0">
+            <a:schemeClr val="accent1"/>
+          </a:fillRef>
+          <a:effectRef idx="0">
+            <a:schemeClr val="accent1"/>
+          </a:effectRef>
+          <a:fontRef idx="minor">
+            <a:schemeClr val="tx1"/>
+          </a:fontRef>
+        </p:style>
+      </p:cxnSp>
+      <p:cxnSp>
+        <p:nvCxnSpPr>
+          <p:cNvPr id="87" name="Elbow Connector 86">
+            <a:extLst>
+              <a:ext uri="{FF2B5EF4-FFF2-40B4-BE49-F238E27FC236}">
+                <a16:creationId xmlns:a16="http://schemas.microsoft.com/office/drawing/2014/main" id="{744E5301-393A-2733-B413-6AEBE6A57C18}"/>
+              </a:ext>
+            </a:extLst>
+          </p:cNvPr>
+          <p:cNvCxnSpPr>
+            <a:cxnSpLocks/>
+            <a:stCxn id="44" idx="0"/>
+            <a:endCxn id="4" idx="2"/>
+          </p:cNvCxnSpPr>
+          <p:nvPr/>
+        </p:nvCxnSpPr>
+        <p:spPr>
+          <a:xfrm rot="16200000" flipV="1">
+            <a:off x="1297780" y="2636450"/>
+            <a:ext cx="2050842" cy="1455020"/>
+          </a:xfrm>
+          <a:prstGeom prst="bentConnector3">
+            <a:avLst>
+              <a:gd name="adj1" fmla="val 50000"/>
+            </a:avLst>
+          </a:prstGeom>
+          <a:ln w="9525">
+            <a:solidFill>
+              <a:srgbClr val="C00000"/>
+            </a:solidFill>
+            <a:tailEnd type="triangle"/>
+          </a:ln>
+        </p:spPr>
+        <p:style>
+          <a:lnRef idx="1">
+            <a:schemeClr val="accent1"/>
+          </a:lnRef>
+          <a:fillRef idx="0">
+            <a:schemeClr val="accent1"/>
+          </a:fillRef>
+          <a:effectRef idx="0">
+            <a:schemeClr val="accent1"/>
+          </a:effectRef>
+          <a:fontRef idx="minor">
+            <a:schemeClr val="tx1"/>
+          </a:fontRef>
+        </p:style>
+      </p:cxnSp>
+      <p:cxnSp>
+        <p:nvCxnSpPr>
+          <p:cNvPr id="90" name="Elbow Connector 89">
+            <a:extLst>
+              <a:ext uri="{FF2B5EF4-FFF2-40B4-BE49-F238E27FC236}">
+                <a16:creationId xmlns:a16="http://schemas.microsoft.com/office/drawing/2014/main" id="{89E2275E-9029-DECD-82B7-99EC898B877A}"/>
+              </a:ext>
+            </a:extLst>
+          </p:cNvPr>
+          <p:cNvCxnSpPr>
+            <a:cxnSpLocks/>
+            <a:stCxn id="8" idx="2"/>
+            <a:endCxn id="11" idx="2"/>
+          </p:cNvCxnSpPr>
+          <p:nvPr/>
+        </p:nvCxnSpPr>
+        <p:spPr>
+          <a:xfrm rot="5400000" flipH="1">
+            <a:off x="5756853" y="340865"/>
+            <a:ext cx="1327765" cy="8878546"/>
+          </a:xfrm>
+          <a:prstGeom prst="bentConnector3">
+            <a:avLst>
+              <a:gd name="adj1" fmla="val -17217"/>
+            </a:avLst>
+          </a:prstGeom>
+          <a:ln w="9525">
+            <a:solidFill>
+              <a:srgbClr val="C00000"/>
+            </a:solidFill>
+            <a:tailEnd type="triangle"/>
+          </a:ln>
+        </p:spPr>
+        <p:style>
+          <a:lnRef idx="1">
+            <a:schemeClr val="accent1"/>
+          </a:lnRef>
+          <a:fillRef idx="0">
+            <a:schemeClr val="accent1"/>
+          </a:fillRef>
+          <a:effectRef idx="0">
+            <a:schemeClr val="accent1"/>
+          </a:effectRef>
+          <a:fontRef idx="minor">
+            <a:schemeClr val="tx1"/>
+          </a:fontRef>
+        </p:style>
+      </p:cxnSp>
+      <p:sp>
+        <p:nvSpPr>
+          <p:cNvPr id="97" name="TextBox 96">
+            <a:extLst>
+              <a:ext uri="{FF2B5EF4-FFF2-40B4-BE49-F238E27FC236}">
+                <a16:creationId xmlns:a16="http://schemas.microsoft.com/office/drawing/2014/main" id="{C2FC38F6-6E10-C924-30DC-372004572DF2}"/>
+              </a:ext>
+            </a:extLst>
+          </p:cNvPr>
+          <p:cNvSpPr txBox="1"/>
+          <p:nvPr/>
+        </p:nvSpPr>
+        <p:spPr>
+          <a:xfrm>
+            <a:off x="500016" y="5775235"/>
+            <a:ext cx="10359992" cy="3046988"/>
+          </a:xfrm>
+          <a:prstGeom prst="rect">
+            <a:avLst/>
+          </a:prstGeom>
+          <a:noFill/>
+        </p:spPr>
+        <p:txBody>
+          <a:bodyPr wrap="square" rtlCol="0">
+            <a:spAutoFit/>
+          </a:bodyPr>
+          <a:lstStyle/>
+          <a:p>
+            <a:r>
+              <a:rPr lang="en-US" sz="1200" dirty="0"/>
+              <a:t>When upload diagram is called (red arrows), the following occurs:</a:t>
+            </a:r>
+          </a:p>
+          <a:p>
+            <a:pPr marL="228600" indent="-228600">
+              <a:buFont typeface="+mj-lt"/>
+              <a:buAutoNum type="arabicPeriod"/>
+            </a:pPr>
+            <a:r>
+              <a:rPr lang="en-US" sz="1200" dirty="0"/>
+              <a:t>Upload </a:t>
+            </a:r>
+            <a:r>
+              <a:rPr lang="en-US" sz="1200" dirty="0" err="1"/>
+              <a:t>cytoscape.js</a:t>
+            </a:r>
+            <a:r>
+              <a:rPr lang="en-US" sz="1200" dirty="0"/>
+              <a:t> </a:t>
+            </a:r>
+            <a:r>
+              <a:rPr lang="en-US" sz="1200" dirty="0" err="1"/>
+              <a:t>json</a:t>
+            </a:r>
+            <a:r>
+              <a:rPr lang="en-US" sz="1200" dirty="0"/>
+              <a:t> to the central space (saved in a shared file), enabling other users to edit the same pathway diagram</a:t>
+            </a:r>
+          </a:p>
+          <a:p>
+            <a:pPr marL="228600" indent="-228600">
+              <a:buFont typeface="+mj-lt"/>
+              <a:buAutoNum type="arabicPeriod"/>
+            </a:pPr>
+            <a:r>
+              <a:rPr lang="en-US" sz="1200" dirty="0"/>
+              <a:t>Create or update </a:t>
+            </a:r>
+            <a:r>
+              <a:rPr lang="en-US" sz="1200" dirty="0" err="1"/>
+              <a:t>PathwayDiagram</a:t>
+            </a:r>
+            <a:r>
+              <a:rPr lang="en-US" sz="1200" dirty="0"/>
+              <a:t> instance associated with this </a:t>
+            </a:r>
+            <a:r>
+              <a:rPr lang="en-US" sz="1200" dirty="0" err="1"/>
+              <a:t>cytoscape.js</a:t>
+            </a:r>
+            <a:r>
+              <a:rPr lang="en-US" sz="1200" dirty="0"/>
+              <a:t>. This will be handled by the backend for better and more robust control.</a:t>
+            </a:r>
+          </a:p>
+          <a:p>
+            <a:pPr marL="228600" indent="-228600">
+              <a:buFont typeface="+mj-lt"/>
+              <a:buAutoNum type="arabicPeriod"/>
+            </a:pPr>
+            <a:r>
+              <a:rPr lang="en-US" sz="1200" dirty="0"/>
+              <a:t>Generate diagram </a:t>
+            </a:r>
+            <a:r>
+              <a:rPr lang="en-US" sz="1200" dirty="0" err="1"/>
+              <a:t>json</a:t>
+            </a:r>
+            <a:r>
+              <a:rPr lang="en-US" sz="1200" dirty="0"/>
+              <a:t> files for the represented pathways, including both normal and disease pathways if applicable</a:t>
+            </a:r>
+          </a:p>
+          <a:p>
+            <a:pPr marL="228600" indent="-228600">
+              <a:buFont typeface="+mj-lt"/>
+              <a:buAutoNum type="arabicPeriod"/>
+            </a:pPr>
+            <a:endParaRPr lang="en-US" sz="1200" dirty="0"/>
+          </a:p>
+          <a:p>
+            <a:r>
+              <a:rPr lang="en-US" sz="1200" dirty="0"/>
+              <a:t>Notes:</a:t>
+            </a:r>
+          </a:p>
+          <a:p>
+            <a:pPr marL="228600" indent="-228600">
+              <a:buFont typeface="+mj-lt"/>
+              <a:buAutoNum type="arabicPeriod"/>
+            </a:pPr>
+            <a:r>
+              <a:rPr lang="en-US" sz="1200" dirty="0"/>
+              <a:t>After the diagram is edited (e.g. moving a node), which will be tracked, closing the </a:t>
+            </a:r>
+            <a:r>
+              <a:rPr lang="en-US" sz="1200" dirty="0" err="1"/>
+              <a:t>brower</a:t>
+            </a:r>
+            <a:r>
+              <a:rPr lang="en-US" sz="1200" dirty="0"/>
+              <a:t>, reload, or switch to another diagram will ask the user if they want to upload the diagram. Otherwise, the change will be gone.</a:t>
+            </a:r>
+          </a:p>
+          <a:p>
+            <a:pPr marL="228600" indent="-228600">
+              <a:buFont typeface="+mj-lt"/>
+              <a:buAutoNum type="arabicPeriod"/>
+            </a:pPr>
+            <a:r>
+              <a:rPr lang="en-US" sz="1200" dirty="0"/>
+              <a:t>This will be enforced: no event related instances (Event, </a:t>
+            </a:r>
+            <a:r>
+              <a:rPr lang="en-US" sz="1200" dirty="0" err="1"/>
+              <a:t>PhysicalEntity</a:t>
+            </a:r>
+            <a:r>
+              <a:rPr lang="en-US" sz="1200" dirty="0"/>
+              <a:t>, Regulation, </a:t>
+            </a:r>
+            <a:r>
+              <a:rPr lang="en-US" sz="1200" dirty="0" err="1"/>
+              <a:t>CatalystActivity</a:t>
+            </a:r>
+            <a:r>
+              <a:rPr lang="en-US" sz="1200" dirty="0"/>
+              <a:t>, </a:t>
+            </a:r>
+            <a:r>
+              <a:rPr lang="en-US" sz="1200" dirty="0" err="1"/>
+              <a:t>PathwayDiagram</a:t>
+            </a:r>
+            <a:r>
+              <a:rPr lang="en-US" sz="1200" dirty="0"/>
+              <a:t>) should be outstanding at staged space. This may be overkill, but should be simpler to implement and enforce. Before uploading the pathway diagram, make sure all these instances should be committed first.  </a:t>
+            </a:r>
+          </a:p>
+          <a:p>
+            <a:pPr marL="228600" indent="-228600">
+              <a:buFont typeface="+mj-lt"/>
+              <a:buAutoNum type="arabicPeriod"/>
+            </a:pPr>
+            <a:r>
+              <a:rPr lang="en-US" sz="1200" dirty="0"/>
+              <a:t>For the time being, the edits in one browser will not be synchronized in another browser. </a:t>
+            </a:r>
+          </a:p>
+          <a:p>
+            <a:pPr marL="228600" indent="-228600">
+              <a:buFont typeface="+mj-lt"/>
+              <a:buAutoNum type="arabicPeriod"/>
+            </a:pPr>
+            <a:r>
+              <a:rPr lang="en-US" sz="1200" dirty="0" err="1"/>
+              <a:t>PathwayDigram</a:t>
+            </a:r>
+            <a:r>
+              <a:rPr lang="en-US" sz="1200" dirty="0"/>
+              <a:t> itself can still be edited, but only </a:t>
+            </a:r>
+            <a:r>
+              <a:rPr lang="en-US" sz="1200" dirty="0" err="1"/>
+              <a:t>representedPathway</a:t>
+            </a:r>
+            <a:r>
+              <a:rPr lang="en-US" sz="1200" dirty="0"/>
+              <a:t>. Before uploading the diagram, any edits to it needs to be committed first (see item 2 above).</a:t>
+            </a:r>
+          </a:p>
+          <a:p>
+            <a:pPr marL="228600" indent="-228600">
+              <a:buFont typeface="+mj-lt"/>
+              <a:buAutoNum type="arabicPeriod"/>
+            </a:pPr>
+            <a:endParaRPr lang="en-US" sz="1200" dirty="0"/>
+          </a:p>
+          <a:p>
+            <a:pPr marL="228600" indent="-228600">
+              <a:buFont typeface="+mj-lt"/>
+              <a:buAutoNum type="arabicPeriod"/>
+            </a:pPr>
+            <a:endParaRPr lang="en-US" sz="1200" dirty="0"/>
+          </a:p>
+        </p:txBody>
+      </p:sp>
+      <p:sp>
+        <p:nvSpPr>
+          <p:cNvPr id="117" name="TextBox 116">
+            <a:extLst>
+              <a:ext uri="{FF2B5EF4-FFF2-40B4-BE49-F238E27FC236}">
+                <a16:creationId xmlns:a16="http://schemas.microsoft.com/office/drawing/2014/main" id="{DE45C6D2-7AEF-61B2-6BF9-E6F3FBBB985F}"/>
+              </a:ext>
+            </a:extLst>
+          </p:cNvPr>
+          <p:cNvSpPr txBox="1"/>
+          <p:nvPr/>
+        </p:nvSpPr>
+        <p:spPr>
+          <a:xfrm>
+            <a:off x="1916875" y="5071536"/>
+            <a:ext cx="750670" cy="461665"/>
+          </a:xfrm>
+          <a:prstGeom prst="rect">
+            <a:avLst/>
+          </a:prstGeom>
+          <a:noFill/>
+        </p:spPr>
+        <p:txBody>
+          <a:bodyPr wrap="square" rtlCol="0">
+            <a:spAutoFit/>
+          </a:bodyPr>
+          <a:lstStyle/>
+          <a:p>
+            <a:pPr algn="ctr"/>
+            <a:r>
+              <a:rPr lang="en-US" sz="1200" dirty="0"/>
+              <a:t>create or modify</a:t>
+            </a:r>
+          </a:p>
+        </p:txBody>
+      </p:sp>
+      <p:sp>
+        <p:nvSpPr>
+          <p:cNvPr id="118" name="TextBox 117">
+            <a:extLst>
+              <a:ext uri="{FF2B5EF4-FFF2-40B4-BE49-F238E27FC236}">
+                <a16:creationId xmlns:a16="http://schemas.microsoft.com/office/drawing/2014/main" id="{2A449E06-B74B-6C2A-8002-3D3C3EC445B7}"/>
+              </a:ext>
+            </a:extLst>
+          </p:cNvPr>
+          <p:cNvSpPr txBox="1"/>
+          <p:nvPr/>
+        </p:nvSpPr>
+        <p:spPr>
+          <a:xfrm>
+            <a:off x="3003067" y="3718421"/>
+            <a:ext cx="750670" cy="276999"/>
+          </a:xfrm>
+          <a:prstGeom prst="rect">
+            <a:avLst/>
+          </a:prstGeom>
+          <a:noFill/>
+        </p:spPr>
+        <p:txBody>
+          <a:bodyPr wrap="square" rtlCol="0">
+            <a:spAutoFit/>
+          </a:bodyPr>
+          <a:lstStyle/>
+          <a:p>
+            <a:pPr algn="ctr"/>
+            <a:r>
+              <a:rPr lang="en-US" sz="1200" dirty="0"/>
+              <a:t>generate</a:t>
+            </a:r>
+          </a:p>
+        </p:txBody>
+      </p:sp>
+      <p:cxnSp>
+        <p:nvCxnSpPr>
+          <p:cNvPr id="3" name="Elbow Connector 2">
+            <a:extLst>
+              <a:ext uri="{FF2B5EF4-FFF2-40B4-BE49-F238E27FC236}">
+                <a16:creationId xmlns:a16="http://schemas.microsoft.com/office/drawing/2014/main" id="{8F5F5B08-3DC1-7EF5-F3D6-3DD665B848E8}"/>
+              </a:ext>
+            </a:extLst>
+          </p:cNvPr>
+          <p:cNvCxnSpPr>
+            <a:cxnSpLocks/>
+            <a:stCxn id="8" idx="2"/>
+            <a:endCxn id="44" idx="2"/>
+          </p:cNvCxnSpPr>
+          <p:nvPr/>
+        </p:nvCxnSpPr>
+        <p:spPr>
+          <a:xfrm rot="5400000" flipH="1">
+            <a:off x="6659046" y="1243058"/>
+            <a:ext cx="592627" cy="7809298"/>
+          </a:xfrm>
+          <a:prstGeom prst="bentConnector3">
+            <a:avLst>
+              <a:gd name="adj1" fmla="val -38574"/>
+            </a:avLst>
+          </a:prstGeom>
+          <a:ln w="9525">
+            <a:solidFill>
+              <a:srgbClr val="C00000"/>
+            </a:solidFill>
+            <a:tailEnd type="triangle"/>
+          </a:ln>
+        </p:spPr>
+        <p:style>
+          <a:lnRef idx="1">
+            <a:schemeClr val="accent1"/>
+          </a:lnRef>
+          <a:fillRef idx="0">
+            <a:schemeClr val="accent1"/>
+          </a:fillRef>
+          <a:effectRef idx="0">
+            <a:schemeClr val="accent1"/>
+          </a:effectRef>
+          <a:fontRef idx="minor">
+            <a:schemeClr val="tx1"/>
+          </a:fontRef>
+        </p:style>
+      </p:cxnSp>
+      <p:sp>
+        <p:nvSpPr>
+          <p:cNvPr id="14" name="TextBox 13">
+            <a:extLst>
+              <a:ext uri="{FF2B5EF4-FFF2-40B4-BE49-F238E27FC236}">
+                <a16:creationId xmlns:a16="http://schemas.microsoft.com/office/drawing/2014/main" id="{C9466305-BC45-0344-1471-2B26724ACA92}"/>
+              </a:ext>
+            </a:extLst>
+          </p:cNvPr>
+          <p:cNvSpPr txBox="1"/>
+          <p:nvPr/>
+        </p:nvSpPr>
+        <p:spPr>
+          <a:xfrm>
+            <a:off x="3013297" y="5186194"/>
+            <a:ext cx="615874" cy="276999"/>
+          </a:xfrm>
+          <a:prstGeom prst="rect">
+            <a:avLst/>
+          </a:prstGeom>
+          <a:noFill/>
+        </p:spPr>
+        <p:txBody>
+          <a:bodyPr wrap="none" rtlCol="0">
+            <a:spAutoFit/>
+          </a:bodyPr>
+          <a:lstStyle/>
+          <a:p>
+            <a:r>
+              <a:rPr lang="en-US" sz="1200" dirty="0"/>
+              <a:t>upload</a:t>
+            </a:r>
+          </a:p>
+        </p:txBody>
+      </p:sp>
+    </p:spTree>
+    <p:extLst>
+      <p:ext uri="{BB962C8B-B14F-4D97-AF65-F5344CB8AC3E}">
+        <p14:creationId xmlns:p14="http://schemas.microsoft.com/office/powerpoint/2010/main" val="1653719552"/>
       </p:ext>
     </p:extLst>
   </p:cSld>

</xml_diff>